<commit_message>
add POST PUT and DELTE for catalog
</commit_message>
<xml_diff>
--- a/training/day2/Day2.pptx
+++ b/training/day2/Day2.pptx
@@ -5,39 +5,38 @@
     <p:sldMasterId id="2147483648" r:id="rId1"/>
   </p:sldMasterIdLst>
   <p:notesMasterIdLst>
-    <p:notesMasterId r:id="rId32"/>
+    <p:notesMasterId r:id="rId31"/>
   </p:notesMasterIdLst>
   <p:sldIdLst>
     <p:sldId id="414" r:id="rId2"/>
-    <p:sldId id="415" r:id="rId3"/>
-    <p:sldId id="416" r:id="rId4"/>
-    <p:sldId id="417" r:id="rId5"/>
-    <p:sldId id="418" r:id="rId6"/>
-    <p:sldId id="429" r:id="rId7"/>
-    <p:sldId id="419" r:id="rId8"/>
-    <p:sldId id="420" r:id="rId9"/>
-    <p:sldId id="421" r:id="rId10"/>
-    <p:sldId id="422" r:id="rId11"/>
-    <p:sldId id="423" r:id="rId12"/>
-    <p:sldId id="424" r:id="rId13"/>
-    <p:sldId id="425" r:id="rId14"/>
-    <p:sldId id="426" r:id="rId15"/>
-    <p:sldId id="427" r:id="rId16"/>
-    <p:sldId id="428" r:id="rId17"/>
-    <p:sldId id="430" r:id="rId18"/>
-    <p:sldId id="431" r:id="rId19"/>
-    <p:sldId id="432" r:id="rId20"/>
-    <p:sldId id="433" r:id="rId21"/>
-    <p:sldId id="434" r:id="rId22"/>
-    <p:sldId id="435" r:id="rId23"/>
-    <p:sldId id="436" r:id="rId24"/>
-    <p:sldId id="437" r:id="rId25"/>
-    <p:sldId id="438" r:id="rId26"/>
-    <p:sldId id="439" r:id="rId27"/>
-    <p:sldId id="440" r:id="rId28"/>
-    <p:sldId id="441" r:id="rId29"/>
-    <p:sldId id="442" r:id="rId30"/>
-    <p:sldId id="443" r:id="rId31"/>
+    <p:sldId id="416" r:id="rId3"/>
+    <p:sldId id="417" r:id="rId4"/>
+    <p:sldId id="418" r:id="rId5"/>
+    <p:sldId id="429" r:id="rId6"/>
+    <p:sldId id="419" r:id="rId7"/>
+    <p:sldId id="420" r:id="rId8"/>
+    <p:sldId id="421" r:id="rId9"/>
+    <p:sldId id="422" r:id="rId10"/>
+    <p:sldId id="423" r:id="rId11"/>
+    <p:sldId id="424" r:id="rId12"/>
+    <p:sldId id="425" r:id="rId13"/>
+    <p:sldId id="426" r:id="rId14"/>
+    <p:sldId id="427" r:id="rId15"/>
+    <p:sldId id="428" r:id="rId16"/>
+    <p:sldId id="430" r:id="rId17"/>
+    <p:sldId id="431" r:id="rId18"/>
+    <p:sldId id="432" r:id="rId19"/>
+    <p:sldId id="433" r:id="rId20"/>
+    <p:sldId id="434" r:id="rId21"/>
+    <p:sldId id="435" r:id="rId22"/>
+    <p:sldId id="436" r:id="rId23"/>
+    <p:sldId id="437" r:id="rId24"/>
+    <p:sldId id="438" r:id="rId25"/>
+    <p:sldId id="439" r:id="rId26"/>
+    <p:sldId id="440" r:id="rId27"/>
+    <p:sldId id="441" r:id="rId28"/>
+    <p:sldId id="442" r:id="rId29"/>
+    <p:sldId id="443" r:id="rId30"/>
   </p:sldIdLst>
   <p:sldSz cx="12192000" cy="6858000"/>
   <p:notesSz cx="6858000" cy="9144000"/>
@@ -226,7 +225,7 @@
           <a:p>
             <a:fld id="{F15A6252-5F50-4106-9C23-9E03A675631E}" type="datetimeFigureOut">
               <a:rPr lang="en-IN" smtClean="0"/>
-              <a:t>04-05-2020</a:t>
+              <a:t>05-05-2020</a:t>
             </a:fld>
             <a:endParaRPr lang="en-IN"/>
           </a:p>
@@ -643,7 +642,7 @@
           <a:p>
             <a:fld id="{4086692B-153F-4DFE-BFBD-A2AE2C7443B6}" type="datetimeFigureOut">
               <a:rPr lang="en-IN" smtClean="0"/>
-              <a:t>04-05-2020</a:t>
+              <a:t>05-05-2020</a:t>
             </a:fld>
             <a:endParaRPr lang="en-IN"/>
           </a:p>
@@ -843,7 +842,7 @@
           <a:p>
             <a:fld id="{4086692B-153F-4DFE-BFBD-A2AE2C7443B6}" type="datetimeFigureOut">
               <a:rPr lang="en-IN" smtClean="0"/>
-              <a:t>04-05-2020</a:t>
+              <a:t>05-05-2020</a:t>
             </a:fld>
             <a:endParaRPr lang="en-IN"/>
           </a:p>
@@ -1053,7 +1052,7 @@
           <a:p>
             <a:fld id="{4086692B-153F-4DFE-BFBD-A2AE2C7443B6}" type="datetimeFigureOut">
               <a:rPr lang="en-IN" smtClean="0"/>
-              <a:t>04-05-2020</a:t>
+              <a:t>05-05-2020</a:t>
             </a:fld>
             <a:endParaRPr lang="en-IN"/>
           </a:p>
@@ -1253,7 +1252,7 @@
           <a:p>
             <a:fld id="{4086692B-153F-4DFE-BFBD-A2AE2C7443B6}" type="datetimeFigureOut">
               <a:rPr lang="en-IN" smtClean="0"/>
-              <a:t>04-05-2020</a:t>
+              <a:t>05-05-2020</a:t>
             </a:fld>
             <a:endParaRPr lang="en-IN"/>
           </a:p>
@@ -1529,7 +1528,7 @@
           <a:p>
             <a:fld id="{4086692B-153F-4DFE-BFBD-A2AE2C7443B6}" type="datetimeFigureOut">
               <a:rPr lang="en-IN" smtClean="0"/>
-              <a:t>04-05-2020</a:t>
+              <a:t>05-05-2020</a:t>
             </a:fld>
             <a:endParaRPr lang="en-IN"/>
           </a:p>
@@ -1797,7 +1796,7 @@
           <a:p>
             <a:fld id="{4086692B-153F-4DFE-BFBD-A2AE2C7443B6}" type="datetimeFigureOut">
               <a:rPr lang="en-IN" smtClean="0"/>
-              <a:t>04-05-2020</a:t>
+              <a:t>05-05-2020</a:t>
             </a:fld>
             <a:endParaRPr lang="en-IN"/>
           </a:p>
@@ -2212,7 +2211,7 @@
           <a:p>
             <a:fld id="{4086692B-153F-4DFE-BFBD-A2AE2C7443B6}" type="datetimeFigureOut">
               <a:rPr lang="en-IN" smtClean="0"/>
-              <a:t>04-05-2020</a:t>
+              <a:t>05-05-2020</a:t>
             </a:fld>
             <a:endParaRPr lang="en-IN"/>
           </a:p>
@@ -2354,7 +2353,7 @@
           <a:p>
             <a:fld id="{4086692B-153F-4DFE-BFBD-A2AE2C7443B6}" type="datetimeFigureOut">
               <a:rPr lang="en-IN" smtClean="0"/>
-              <a:t>04-05-2020</a:t>
+              <a:t>05-05-2020</a:t>
             </a:fld>
             <a:endParaRPr lang="en-IN"/>
           </a:p>
@@ -2467,7 +2466,7 @@
           <a:p>
             <a:fld id="{4086692B-153F-4DFE-BFBD-A2AE2C7443B6}" type="datetimeFigureOut">
               <a:rPr lang="en-IN" smtClean="0"/>
-              <a:t>04-05-2020</a:t>
+              <a:t>05-05-2020</a:t>
             </a:fld>
             <a:endParaRPr lang="en-IN"/>
           </a:p>
@@ -2780,7 +2779,7 @@
           <a:p>
             <a:fld id="{4086692B-153F-4DFE-BFBD-A2AE2C7443B6}" type="datetimeFigureOut">
               <a:rPr lang="en-IN" smtClean="0"/>
-              <a:t>04-05-2020</a:t>
+              <a:t>05-05-2020</a:t>
             </a:fld>
             <a:endParaRPr lang="en-IN"/>
           </a:p>
@@ -3069,7 +3068,7 @@
           <a:p>
             <a:fld id="{4086692B-153F-4DFE-BFBD-A2AE2C7443B6}" type="datetimeFigureOut">
               <a:rPr lang="en-IN" smtClean="0"/>
-              <a:t>04-05-2020</a:t>
+              <a:t>05-05-2020</a:t>
             </a:fld>
             <a:endParaRPr lang="en-IN"/>
           </a:p>
@@ -3312,7 +3311,7 @@
           <a:p>
             <a:fld id="{4086692B-153F-4DFE-BFBD-A2AE2C7443B6}" type="datetimeFigureOut">
               <a:rPr lang="en-IN" smtClean="0"/>
-              <a:t>04-05-2020</a:t>
+              <a:t>05-05-2020</a:t>
             </a:fld>
             <a:endParaRPr lang="en-IN"/>
           </a:p>
@@ -4035,7 +4034,7 @@
                   <a:schemeClr val="bg1"/>
                 </a:solidFill>
               </a:rPr>
-              <a:t>V. Build, release, run</a:t>
+              <a:t>VI. Processes</a:t>
             </a:r>
           </a:p>
         </p:txBody>
@@ -4074,7 +4073,7 @@
                   <a:schemeClr val="bg1"/>
                 </a:solidFill>
               </a:rPr>
-              <a:t>Strictly separate build and run stages</a:t>
+              <a:t>Execute the app as one or more stateless processes</a:t>
             </a:r>
           </a:p>
           <a:p>
@@ -4091,53 +4090,37 @@
                   <a:schemeClr val="bg1"/>
                 </a:solidFill>
               </a:rPr>
-              <a:t>	</a:t>
-            </a:r>
-            <a:r>
-              <a:rPr lang="en-US" b="1" dirty="0" err="1">
-                <a:solidFill>
-                  <a:schemeClr val="bg1"/>
-                </a:solidFill>
-              </a:rPr>
-              <a:t>Seperate</a:t>
-            </a:r>
-            <a:r>
-              <a:rPr lang="en-US" b="1" dirty="0">
-                <a:solidFill>
-                  <a:schemeClr val="bg1"/>
-                </a:solidFill>
-              </a:rPr>
-              <a:t> build, release, and run stages for each app</a:t>
-            </a:r>
-          </a:p>
-          <a:p>
-            <a:r>
-              <a:rPr lang="en-US" b="1" dirty="0">
-                <a:solidFill>
-                  <a:schemeClr val="bg1"/>
-                </a:solidFill>
-              </a:rPr>
-              <a:t>	Additional recommendation</a:t>
-            </a:r>
-          </a:p>
-          <a:p>
-            <a:r>
-              <a:rPr lang="en-US" b="1" dirty="0">
-                <a:solidFill>
-                  <a:schemeClr val="bg1"/>
-                </a:solidFill>
-              </a:rPr>
-              <a:t>		Use CI/C (D)Delivery tool to automate builds. </a:t>
-            </a:r>
-          </a:p>
-          <a:p>
-            <a:r>
-              <a:rPr lang="en-US" b="1" dirty="0">
-                <a:solidFill>
-                  <a:schemeClr val="bg1"/>
-                </a:solidFill>
-              </a:rPr>
-              <a:t>		Docker images make it easy to separate the build and run stages. </a:t>
+              <a:t>	Your application needs to be stateless. </a:t>
+            </a:r>
+          </a:p>
+          <a:p>
+            <a:r>
+              <a:rPr lang="en-US" b="1" dirty="0">
+                <a:solidFill>
+                  <a:schemeClr val="bg1"/>
+                </a:solidFill>
+              </a:rPr>
+              <a:t>	Adv. </a:t>
+            </a:r>
+          </a:p>
+          <a:p>
+            <a:r>
+              <a:rPr lang="en-US" b="1" dirty="0">
+                <a:solidFill>
+                  <a:schemeClr val="bg1"/>
+                </a:solidFill>
+              </a:rPr>
+              <a:t>		Scale out. </a:t>
+            </a:r>
+          </a:p>
+          <a:p>
+            <a:r>
+              <a:rPr lang="en-US" b="1" dirty="0">
+                <a:solidFill>
+                  <a:schemeClr val="bg1"/>
+                </a:solidFill>
+              </a:rPr>
+              <a:t>	Store sharable data in a backing service.</a:t>
             </a:r>
           </a:p>
           <a:p>
@@ -4155,7 +4138,7 @@
     </p:spTree>
     <p:extLst>
       <p:ext uri="{BB962C8B-B14F-4D97-AF65-F5344CB8AC3E}">
-        <p14:creationId xmlns:p14="http://schemas.microsoft.com/office/powerpoint/2010/main" val="1502795110"/>
+        <p14:creationId xmlns:p14="http://schemas.microsoft.com/office/powerpoint/2010/main" val="52869377"/>
       </p:ext>
     </p:extLst>
   </p:cSld>
@@ -4225,7 +4208,7 @@
                   <a:schemeClr val="bg1"/>
                 </a:solidFill>
               </a:rPr>
-              <a:t>VI. Processes</a:t>
+              <a:t>VII. Port binding</a:t>
             </a:r>
           </a:p>
         </p:txBody>
@@ -4245,7 +4228,7 @@
         <p:spPr>
           <a:xfrm>
             <a:off x="838200" y="1779687"/>
-            <a:ext cx="10515600" cy="2031325"/>
+            <a:ext cx="10515600" cy="2308324"/>
           </a:xfrm>
           <a:prstGeom prst="rect">
             <a:avLst/>
@@ -4264,7 +4247,7 @@
                   <a:schemeClr val="bg1"/>
                 </a:solidFill>
               </a:rPr>
-              <a:t>Execute the app as one or more stateless processes</a:t>
+              <a:t>Export services via port binding</a:t>
             </a:r>
           </a:p>
           <a:p>
@@ -4281,37 +4264,37 @@
                   <a:schemeClr val="bg1"/>
                 </a:solidFill>
               </a:rPr>
-              <a:t>	Your application needs to be stateless. </a:t>
-            </a:r>
-          </a:p>
-          <a:p>
-            <a:r>
-              <a:rPr lang="en-US" b="1" dirty="0">
-                <a:solidFill>
-                  <a:schemeClr val="bg1"/>
-                </a:solidFill>
-              </a:rPr>
-              <a:t>	Adv. </a:t>
-            </a:r>
-          </a:p>
-          <a:p>
-            <a:r>
-              <a:rPr lang="en-US" b="1" dirty="0">
-                <a:solidFill>
-                  <a:schemeClr val="bg1"/>
-                </a:solidFill>
-              </a:rPr>
-              <a:t>		Scale out. </a:t>
-            </a:r>
-          </a:p>
-          <a:p>
-            <a:r>
-              <a:rPr lang="en-US" b="1" dirty="0">
-                <a:solidFill>
-                  <a:schemeClr val="bg1"/>
-                </a:solidFill>
-              </a:rPr>
-              <a:t>	Store sharable data in a backing service.</a:t>
+              <a:t>	allow access to the persistent data owned by a service only via the service’s API. </a:t>
+            </a:r>
+          </a:p>
+          <a:p>
+            <a:r>
+              <a:rPr lang="en-US" b="1" dirty="0">
+                <a:solidFill>
+                  <a:schemeClr val="bg1"/>
+                </a:solidFill>
+              </a:rPr>
+              <a:t>	Prevents implicit service contracts between microservices and ensures that microservices can’t become tightly coupled. </a:t>
+            </a:r>
+          </a:p>
+          <a:p>
+            <a:r>
+              <a:rPr lang="en-US" b="1" dirty="0">
+                <a:solidFill>
+                  <a:schemeClr val="bg1"/>
+                </a:solidFill>
+              </a:rPr>
+              <a:t>	Data isolation </a:t>
+            </a:r>
+          </a:p>
+          <a:p>
+            <a:r>
+              <a:rPr lang="en-US" b="1" dirty="0">
+                <a:solidFill>
+                  <a:schemeClr val="bg1"/>
+                </a:solidFill>
+              </a:rPr>
+              <a:t>		allows developer to choose right data store for each service.</a:t>
             </a:r>
           </a:p>
           <a:p>
@@ -4329,7 +4312,7 @@
     </p:spTree>
     <p:extLst>
       <p:ext uri="{BB962C8B-B14F-4D97-AF65-F5344CB8AC3E}">
-        <p14:creationId xmlns:p14="http://schemas.microsoft.com/office/powerpoint/2010/main" val="52869377"/>
+        <p14:creationId xmlns:p14="http://schemas.microsoft.com/office/powerpoint/2010/main" val="4003338177"/>
       </p:ext>
     </p:extLst>
   </p:cSld>
@@ -4399,7 +4382,7 @@
                   <a:schemeClr val="bg1"/>
                 </a:solidFill>
               </a:rPr>
-              <a:t>VII. Port binding</a:t>
+              <a:t>VIII. Concurrency</a:t>
             </a:r>
           </a:p>
         </p:txBody>
@@ -4419,7 +4402,7 @@
         <p:spPr>
           <a:xfrm>
             <a:off x="838200" y="1779687"/>
-            <a:ext cx="10515600" cy="2308324"/>
+            <a:ext cx="10515600" cy="923330"/>
           </a:xfrm>
           <a:prstGeom prst="rect">
             <a:avLst/>
@@ -4438,64 +4421,27 @@
                   <a:schemeClr val="bg1"/>
                 </a:solidFill>
               </a:rPr>
-              <a:t>Export services via port binding</a:t>
-            </a:r>
-          </a:p>
-          <a:p>
-            <a:endParaRPr lang="en-US" b="1" dirty="0">
-              <a:solidFill>
-                <a:schemeClr val="bg1"/>
-              </a:solidFill>
-            </a:endParaRPr>
-          </a:p>
-          <a:p>
-            <a:r>
-              <a:rPr lang="en-US" b="1" dirty="0">
-                <a:solidFill>
-                  <a:schemeClr val="bg1"/>
-                </a:solidFill>
-              </a:rPr>
-              <a:t>	allow access to the persistent data owned by a service only via the service’s API. </a:t>
-            </a:r>
-          </a:p>
-          <a:p>
-            <a:r>
-              <a:rPr lang="en-US" b="1" dirty="0">
-                <a:solidFill>
-                  <a:schemeClr val="bg1"/>
-                </a:solidFill>
-              </a:rPr>
-              <a:t>	Prevents implicit service contracts between microservices and ensures that microservices can’t become tightly coupled. </a:t>
-            </a:r>
-          </a:p>
-          <a:p>
-            <a:r>
-              <a:rPr lang="en-US" b="1" dirty="0">
-                <a:solidFill>
-                  <a:schemeClr val="bg1"/>
-                </a:solidFill>
-              </a:rPr>
-              <a:t>	Data isolation </a:t>
-            </a:r>
-          </a:p>
-          <a:p>
-            <a:r>
-              <a:rPr lang="en-US" b="1" dirty="0">
-                <a:solidFill>
-                  <a:schemeClr val="bg1"/>
-                </a:solidFill>
-              </a:rPr>
-              <a:t>		allows developer to choose right data store for each service.</a:t>
-            </a:r>
-          </a:p>
-          <a:p>
-            <a:r>
-              <a:rPr lang="en-US" dirty="0">
-                <a:solidFill>
-                  <a:schemeClr val="bg1"/>
-                </a:solidFill>
-              </a:rPr>
-              <a:t>	</a:t>
+              <a:t>Scale out via the process model</a:t>
+            </a:r>
+          </a:p>
+          <a:p>
+            <a:r>
+              <a:rPr lang="en-US" b="1" dirty="0">
+                <a:solidFill>
+                  <a:schemeClr val="bg1"/>
+                </a:solidFill>
+              </a:rPr>
+              <a:t>	The Unix process model: almost predecessor to true microservices architecture, </a:t>
+            </a:r>
+          </a:p>
+          <a:p>
+            <a:r>
+              <a:rPr lang="en-US" b="1" dirty="0">
+                <a:solidFill>
+                  <a:schemeClr val="bg1"/>
+                </a:solidFill>
+              </a:rPr>
+              <a:t>	Scale out each service independently.</a:t>
             </a:r>
           </a:p>
         </p:txBody>
@@ -4503,7 +4449,7 @@
     </p:spTree>
     <p:extLst>
       <p:ext uri="{BB962C8B-B14F-4D97-AF65-F5344CB8AC3E}">
-        <p14:creationId xmlns:p14="http://schemas.microsoft.com/office/powerpoint/2010/main" val="4003338177"/>
+        <p14:creationId xmlns:p14="http://schemas.microsoft.com/office/powerpoint/2010/main" val="2465419147"/>
       </p:ext>
     </p:extLst>
   </p:cSld>
@@ -4573,7 +4519,7 @@
                   <a:schemeClr val="bg1"/>
                 </a:solidFill>
               </a:rPr>
-              <a:t>VIII. Concurrency</a:t>
+              <a:t>IX. Disposability</a:t>
             </a:r>
           </a:p>
         </p:txBody>
@@ -4593,7 +4539,7 @@
         <p:spPr>
           <a:xfrm>
             <a:off x="838200" y="1779687"/>
-            <a:ext cx="10515600" cy="923330"/>
+            <a:ext cx="10515600" cy="3139321"/>
           </a:xfrm>
           <a:prstGeom prst="rect">
             <a:avLst/>
@@ -4612,27 +4558,107 @@
                   <a:schemeClr val="bg1"/>
                 </a:solidFill>
               </a:rPr>
-              <a:t>Scale out via the process model</a:t>
-            </a:r>
-          </a:p>
-          <a:p>
-            <a:r>
-              <a:rPr lang="en-US" b="1" dirty="0">
-                <a:solidFill>
-                  <a:schemeClr val="bg1"/>
-                </a:solidFill>
-              </a:rPr>
-              <a:t>	The Unix process model: almost predecessor to true microservices architecture, </a:t>
-            </a:r>
-          </a:p>
-          <a:p>
-            <a:r>
-              <a:rPr lang="en-US" b="1" dirty="0">
-                <a:solidFill>
-                  <a:schemeClr val="bg1"/>
-                </a:solidFill>
-              </a:rPr>
-              <a:t>	Scale out each service independently.</a:t>
+              <a:t>Maximize robustness with fast startup and graceful shutdown</a:t>
+            </a:r>
+          </a:p>
+          <a:p>
+            <a:r>
+              <a:rPr lang="en-US" b="1" dirty="0">
+                <a:solidFill>
+                  <a:schemeClr val="bg1"/>
+                </a:solidFill>
+              </a:rPr>
+              <a:t>	Service instances need to be disposable </a:t>
+            </a:r>
+          </a:p>
+          <a:p>
+            <a:r>
+              <a:rPr lang="en-US" b="1" dirty="0">
+                <a:solidFill>
+                  <a:schemeClr val="bg1"/>
+                </a:solidFill>
+              </a:rPr>
+              <a:t>		For this:</a:t>
+            </a:r>
+          </a:p>
+          <a:p>
+            <a:r>
+              <a:rPr lang="en-US" b="1" dirty="0">
+                <a:solidFill>
+                  <a:schemeClr val="bg1"/>
+                </a:solidFill>
+              </a:rPr>
+              <a:t>			They can be </a:t>
+            </a:r>
+          </a:p>
+          <a:p>
+            <a:r>
+              <a:rPr lang="en-US" b="1" dirty="0">
+                <a:solidFill>
+                  <a:schemeClr val="bg1"/>
+                </a:solidFill>
+              </a:rPr>
+              <a:t>				started, stopped, and redeployed quickly, </a:t>
+            </a:r>
+          </a:p>
+          <a:p>
+            <a:r>
+              <a:rPr lang="en-US" b="1" dirty="0">
+                <a:solidFill>
+                  <a:schemeClr val="bg1"/>
+                </a:solidFill>
+              </a:rPr>
+              <a:t>				with no loss of data. </a:t>
+            </a:r>
+          </a:p>
+          <a:p>
+            <a:r>
+              <a:rPr lang="en-US" b="1" dirty="0">
+                <a:solidFill>
+                  <a:schemeClr val="bg1"/>
+                </a:solidFill>
+              </a:rPr>
+              <a:t>	Docker by default satisfies this</a:t>
+            </a:r>
+          </a:p>
+          <a:p>
+            <a:r>
+              <a:rPr lang="en-US" b="1" dirty="0">
+                <a:solidFill>
+                  <a:schemeClr val="bg1"/>
+                </a:solidFill>
+              </a:rPr>
+              <a:t>	Store state or session data in other backing services </a:t>
+            </a:r>
+          </a:p>
+          <a:p>
+            <a:r>
+              <a:rPr lang="en-US" b="1" dirty="0">
+                <a:solidFill>
+                  <a:schemeClr val="bg1"/>
+                </a:solidFill>
+              </a:rPr>
+              <a:t>		So request are handled seamlessly. </a:t>
+            </a:r>
+          </a:p>
+          <a:p>
+            <a:r>
+              <a:rPr lang="en-US" b="1" dirty="0">
+                <a:solidFill>
+                  <a:schemeClr val="bg1"/>
+                </a:solidFill>
+              </a:rPr>
+              <a:t>	Preferably use a backing store to support crash only design.</a:t>
+            </a:r>
+          </a:p>
+          <a:p>
+            <a:r>
+              <a:rPr lang="en-US" dirty="0">
+                <a:solidFill>
+                  <a:schemeClr val="bg1"/>
+                </a:solidFill>
+              </a:rPr>
+              <a:t>	</a:t>
             </a:r>
           </a:p>
         </p:txBody>
@@ -4640,7 +4666,7 @@
     </p:spTree>
     <p:extLst>
       <p:ext uri="{BB962C8B-B14F-4D97-AF65-F5344CB8AC3E}">
-        <p14:creationId xmlns:p14="http://schemas.microsoft.com/office/powerpoint/2010/main" val="2465419147"/>
+        <p14:creationId xmlns:p14="http://schemas.microsoft.com/office/powerpoint/2010/main" val="3615866565"/>
       </p:ext>
     </p:extLst>
   </p:cSld>
@@ -4710,7 +4736,7 @@
                   <a:schemeClr val="bg1"/>
                 </a:solidFill>
               </a:rPr>
-              <a:t>IX. Disposability</a:t>
+              <a:t>X. Dev/prod parity</a:t>
             </a:r>
           </a:p>
         </p:txBody>
@@ -4730,7 +4756,7 @@
         <p:spPr>
           <a:xfrm>
             <a:off x="838200" y="1779687"/>
-            <a:ext cx="10515600" cy="3139321"/>
+            <a:ext cx="10515600" cy="2031325"/>
           </a:xfrm>
           <a:prstGeom prst="rect">
             <a:avLst/>
@@ -4749,97 +4775,73 @@
                   <a:schemeClr val="bg1"/>
                 </a:solidFill>
               </a:rPr>
-              <a:t>Maximize robustness with fast startup and graceful shutdown</a:t>
-            </a:r>
-          </a:p>
-          <a:p>
-            <a:r>
-              <a:rPr lang="en-US" b="1" dirty="0">
-                <a:solidFill>
-                  <a:schemeClr val="bg1"/>
-                </a:solidFill>
-              </a:rPr>
-              <a:t>	Service instances need to be disposable </a:t>
-            </a:r>
-          </a:p>
-          <a:p>
-            <a:r>
-              <a:rPr lang="en-US" b="1" dirty="0">
-                <a:solidFill>
-                  <a:schemeClr val="bg1"/>
-                </a:solidFill>
-              </a:rPr>
-              <a:t>		For this:</a:t>
-            </a:r>
-          </a:p>
-          <a:p>
-            <a:r>
-              <a:rPr lang="en-US" b="1" dirty="0">
-                <a:solidFill>
-                  <a:schemeClr val="bg1"/>
-                </a:solidFill>
-              </a:rPr>
-              <a:t>			They can be </a:t>
-            </a:r>
-          </a:p>
-          <a:p>
-            <a:r>
-              <a:rPr lang="en-US" b="1" dirty="0">
-                <a:solidFill>
-                  <a:schemeClr val="bg1"/>
-                </a:solidFill>
-              </a:rPr>
-              <a:t>				started, stopped, and redeployed quickly, </a:t>
-            </a:r>
-          </a:p>
-          <a:p>
-            <a:r>
-              <a:rPr lang="en-US" b="1" dirty="0">
-                <a:solidFill>
-                  <a:schemeClr val="bg1"/>
-                </a:solidFill>
-              </a:rPr>
-              <a:t>				with no loss of data. </a:t>
-            </a:r>
-          </a:p>
-          <a:p>
-            <a:r>
-              <a:rPr lang="en-US" b="1" dirty="0">
-                <a:solidFill>
-                  <a:schemeClr val="bg1"/>
-                </a:solidFill>
-              </a:rPr>
-              <a:t>	Docker by default satisfies this</a:t>
-            </a:r>
-          </a:p>
-          <a:p>
-            <a:r>
-              <a:rPr lang="en-US" b="1" dirty="0">
-                <a:solidFill>
-                  <a:schemeClr val="bg1"/>
-                </a:solidFill>
-              </a:rPr>
-              <a:t>	Store state or session data in other backing services </a:t>
-            </a:r>
-          </a:p>
-          <a:p>
-            <a:r>
-              <a:rPr lang="en-US" b="1" dirty="0">
-                <a:solidFill>
-                  <a:schemeClr val="bg1"/>
-                </a:solidFill>
-              </a:rPr>
-              <a:t>		So request are handled seamlessly. </a:t>
-            </a:r>
-          </a:p>
-          <a:p>
-            <a:r>
-              <a:rPr lang="en-US" b="1" dirty="0">
-                <a:solidFill>
-                  <a:schemeClr val="bg1"/>
-                </a:solidFill>
-              </a:rPr>
-              <a:t>	Preferably use a backing store to support crash only design.</a:t>
+              <a:t>	Keep development, staging, and production as similar as possible</a:t>
+            </a:r>
+          </a:p>
+          <a:p>
+            <a:r>
+              <a:rPr lang="en-US" b="1" dirty="0">
+                <a:solidFill>
+                  <a:schemeClr val="bg1"/>
+                </a:solidFill>
+              </a:rPr>
+              <a:t>	Maintain diff. env. as identical as possible</a:t>
+            </a:r>
+          </a:p>
+          <a:p>
+            <a:r>
+              <a:rPr lang="en-US" b="1" dirty="0">
+                <a:solidFill>
+                  <a:schemeClr val="bg1"/>
+                </a:solidFill>
+              </a:rPr>
+              <a:t>		development, staging, production, </a:t>
+            </a:r>
+            <a:r>
+              <a:rPr lang="en-US" b="1" dirty="0" err="1">
+                <a:solidFill>
+                  <a:schemeClr val="bg1"/>
+                </a:solidFill>
+              </a:rPr>
+              <a:t>ect</a:t>
+            </a:r>
+            <a:r>
+              <a:rPr lang="en-US" b="1" dirty="0">
+                <a:solidFill>
+                  <a:schemeClr val="bg1"/>
+                </a:solidFill>
+              </a:rPr>
+              <a:t>.. </a:t>
+            </a:r>
+          </a:p>
+          <a:p>
+            <a:r>
+              <a:rPr lang="en-US" b="1" dirty="0">
+                <a:solidFill>
+                  <a:schemeClr val="bg1"/>
+                </a:solidFill>
+              </a:rPr>
+              <a:t>Adv.</a:t>
+            </a:r>
+          </a:p>
+          <a:p>
+            <a:r>
+              <a:rPr lang="en-US" b="1" dirty="0">
+                <a:solidFill>
+                  <a:schemeClr val="bg1"/>
+                </a:solidFill>
+              </a:rPr>
+              <a:t>	Env. specific issues/bugs are mitigated</a:t>
+            </a:r>
+          </a:p>
+          <a:p>
+            <a:r>
+              <a:rPr lang="en-US" b="1" dirty="0">
+                <a:solidFill>
+                  <a:schemeClr val="bg1"/>
+                </a:solidFill>
+              </a:rPr>
+              <a:t>Preferably use Docker </a:t>
             </a:r>
           </a:p>
           <a:p>
@@ -4857,7 +4859,7 @@
     </p:spTree>
     <p:extLst>
       <p:ext uri="{BB962C8B-B14F-4D97-AF65-F5344CB8AC3E}">
-        <p14:creationId xmlns:p14="http://schemas.microsoft.com/office/powerpoint/2010/main" val="3615866565"/>
+        <p14:creationId xmlns:p14="http://schemas.microsoft.com/office/powerpoint/2010/main" val="3276696403"/>
       </p:ext>
     </p:extLst>
   </p:cSld>
@@ -4922,13 +4924,20 @@
           <a:lstStyle/>
           <a:p>
             <a:r>
-              <a:rPr lang="en-US" b="1" dirty="0">
-                <a:solidFill>
-                  <a:schemeClr val="bg1"/>
-                </a:solidFill>
-              </a:rPr>
-              <a:t>X. Dev/prod parity</a:t>
-            </a:r>
+              <a:rPr lang="en-US" dirty="0">
+                <a:solidFill>
+                  <a:schemeClr val="bg1"/>
+                </a:solidFill>
+                <a:latin typeface="+mn-lt"/>
+              </a:rPr>
+              <a:t>XI. Logs</a:t>
+            </a:r>
+            <a:endParaRPr lang="en-IN" dirty="0">
+              <a:solidFill>
+                <a:schemeClr val="bg1"/>
+              </a:solidFill>
+              <a:latin typeface="+mn-lt"/>
+            </a:endParaRPr>
           </a:p>
         </p:txBody>
       </p:sp>
@@ -4947,7 +4956,7 @@
         <p:spPr>
           <a:xfrm>
             <a:off x="838200" y="1779687"/>
-            <a:ext cx="10515600" cy="2031325"/>
+            <a:ext cx="10515600" cy="1200329"/>
           </a:xfrm>
           <a:prstGeom prst="rect">
             <a:avLst/>
@@ -4966,73 +4975,27 @@
                   <a:schemeClr val="bg1"/>
                 </a:solidFill>
               </a:rPr>
-              <a:t>	Keep development, staging, and production as similar as possible</a:t>
-            </a:r>
-          </a:p>
-          <a:p>
-            <a:r>
-              <a:rPr lang="en-US" b="1" dirty="0">
-                <a:solidFill>
-                  <a:schemeClr val="bg1"/>
-                </a:solidFill>
-              </a:rPr>
-              <a:t>	Maintain diff. env. as identical as possible</a:t>
-            </a:r>
-          </a:p>
-          <a:p>
-            <a:r>
-              <a:rPr lang="en-US" b="1" dirty="0">
-                <a:solidFill>
-                  <a:schemeClr val="bg1"/>
-                </a:solidFill>
-              </a:rPr>
-              <a:t>		development, staging, production, </a:t>
-            </a:r>
-            <a:r>
-              <a:rPr lang="en-US" b="1" dirty="0" err="1">
-                <a:solidFill>
-                  <a:schemeClr val="bg1"/>
-                </a:solidFill>
-              </a:rPr>
-              <a:t>ect</a:t>
-            </a:r>
-            <a:r>
-              <a:rPr lang="en-US" b="1" dirty="0">
-                <a:solidFill>
-                  <a:schemeClr val="bg1"/>
-                </a:solidFill>
-              </a:rPr>
-              <a:t>.. </a:t>
-            </a:r>
-          </a:p>
-          <a:p>
-            <a:r>
-              <a:rPr lang="en-US" b="1" dirty="0">
-                <a:solidFill>
-                  <a:schemeClr val="bg1"/>
-                </a:solidFill>
-              </a:rPr>
-              <a:t>Adv.</a:t>
-            </a:r>
-          </a:p>
-          <a:p>
-            <a:r>
-              <a:rPr lang="en-US" b="1" dirty="0">
-                <a:solidFill>
-                  <a:schemeClr val="bg1"/>
-                </a:solidFill>
-              </a:rPr>
-              <a:t>	Env. specific issues/bugs are mitigated</a:t>
-            </a:r>
-          </a:p>
-          <a:p>
-            <a:r>
-              <a:rPr lang="en-US" b="1" dirty="0">
-                <a:solidFill>
-                  <a:schemeClr val="bg1"/>
-                </a:solidFill>
-              </a:rPr>
-              <a:t>Preferably use Docker </a:t>
+              <a:t>Treat logs as event streams</a:t>
+            </a:r>
+          </a:p>
+          <a:p>
+            <a:r>
+              <a:rPr lang="en-US" b="1" dirty="0">
+                <a:solidFill>
+                  <a:schemeClr val="bg1"/>
+                </a:solidFill>
+              </a:rPr>
+              <a:t>	Microservices apps shouldn't include code for routing/storing logs</a:t>
+            </a:r>
+          </a:p>
+          <a:p>
+            <a:r>
+              <a:rPr lang="en-US" b="1" dirty="0">
+                <a:solidFill>
+                  <a:schemeClr val="bg1"/>
+                </a:solidFill>
+              </a:rPr>
+              <a:t>	Use good log management solutions from market</a:t>
             </a:r>
           </a:p>
           <a:p>
@@ -5050,7 +5013,7 @@
     </p:spTree>
     <p:extLst>
       <p:ext uri="{BB962C8B-B14F-4D97-AF65-F5344CB8AC3E}">
-        <p14:creationId xmlns:p14="http://schemas.microsoft.com/office/powerpoint/2010/main" val="3276696403"/>
+        <p14:creationId xmlns:p14="http://schemas.microsoft.com/office/powerpoint/2010/main" val="1869796298"/>
       </p:ext>
     </p:extLst>
   </p:cSld>
@@ -5115,20 +5078,13 @@
           <a:lstStyle/>
           <a:p>
             <a:r>
-              <a:rPr lang="en-US" dirty="0">
-                <a:solidFill>
-                  <a:schemeClr val="bg1"/>
-                </a:solidFill>
-                <a:latin typeface="+mn-lt"/>
-              </a:rPr>
-              <a:t>XI. Logs</a:t>
-            </a:r>
-            <a:endParaRPr lang="en-IN" dirty="0">
-              <a:solidFill>
-                <a:schemeClr val="bg1"/>
-              </a:solidFill>
-              <a:latin typeface="+mn-lt"/>
-            </a:endParaRPr>
+              <a:rPr lang="en-US" b="1" dirty="0">
+                <a:solidFill>
+                  <a:schemeClr val="bg1"/>
+                </a:solidFill>
+              </a:rPr>
+              <a:t>XII. Admin processes</a:t>
+            </a:r>
           </a:p>
         </p:txBody>
       </p:sp>
@@ -5147,7 +5103,7 @@
         <p:spPr>
           <a:xfrm>
             <a:off x="838200" y="1779687"/>
-            <a:ext cx="10515600" cy="1200329"/>
+            <a:ext cx="10515600" cy="1477328"/>
           </a:xfrm>
           <a:prstGeom prst="rect">
             <a:avLst/>
@@ -5166,30 +5122,45 @@
                   <a:schemeClr val="bg1"/>
                 </a:solidFill>
               </a:rPr>
-              <a:t>Treat logs as event streams</a:t>
-            </a:r>
-          </a:p>
-          <a:p>
-            <a:r>
-              <a:rPr lang="en-US" b="1" dirty="0">
-                <a:solidFill>
-                  <a:schemeClr val="bg1"/>
-                </a:solidFill>
-              </a:rPr>
-              <a:t>	Microservices apps shouldn't include code for routing/storing logs</a:t>
-            </a:r>
-          </a:p>
-          <a:p>
-            <a:r>
-              <a:rPr lang="en-US" b="1" dirty="0">
-                <a:solidFill>
-                  <a:schemeClr val="bg1"/>
-                </a:solidFill>
-              </a:rPr>
-              <a:t>	Use good log management solutions from market</a:t>
-            </a:r>
-          </a:p>
-          <a:p>
+              <a:t>Run admin/management tasks as one-off processes</a:t>
+            </a:r>
+          </a:p>
+          <a:p>
+            <a:endParaRPr lang="en-US" b="1" dirty="0">
+              <a:solidFill>
+                <a:schemeClr val="bg1"/>
+              </a:solidFill>
+            </a:endParaRPr>
+          </a:p>
+          <a:p>
+            <a:r>
+              <a:rPr lang="en-US" b="1" dirty="0">
+                <a:solidFill>
+                  <a:schemeClr val="bg1"/>
+                </a:solidFill>
+              </a:rPr>
+              <a:t>	Run administrative and maintenance tasks separately from the app. </a:t>
+            </a:r>
+          </a:p>
+          <a:p>
+            <a:r>
+              <a:rPr lang="en-US" b="1" dirty="0">
+                <a:solidFill>
+                  <a:schemeClr val="bg1"/>
+                </a:solidFill>
+              </a:rPr>
+              <a:t>	Containers make this very easy, </a:t>
+            </a:r>
+          </a:p>
+          <a:p>
+            <a:r>
+              <a:rPr lang="en-US" b="1" dirty="0">
+                <a:solidFill>
+                  <a:schemeClr val="bg1"/>
+                </a:solidFill>
+              </a:rPr>
+              <a:t>		spin up a container just to run a task and then shut it down.</a:t>
+            </a:r>
             <a:r>
               <a:rPr lang="en-US" dirty="0">
                 <a:solidFill>
@@ -5204,7 +5175,7 @@
     </p:spTree>
     <p:extLst>
       <p:ext uri="{BB962C8B-B14F-4D97-AF65-F5344CB8AC3E}">
-        <p14:creationId xmlns:p14="http://schemas.microsoft.com/office/powerpoint/2010/main" val="1869796298"/>
+        <p14:creationId xmlns:p14="http://schemas.microsoft.com/office/powerpoint/2010/main" val="3081215482"/>
       </p:ext>
     </p:extLst>
   </p:cSld>
@@ -5274,7 +5245,7 @@
                   <a:schemeClr val="bg1"/>
                 </a:solidFill>
               </a:rPr>
-              <a:t>XII. Admin processes</a:t>
+              <a:t>as</a:t>
             </a:r>
           </a:p>
         </p:txBody>
@@ -5294,7 +5265,7 @@
         <p:spPr>
           <a:xfrm>
             <a:off x="838200" y="1779687"/>
-            <a:ext cx="10515600" cy="1477328"/>
+            <a:ext cx="10515600" cy="369332"/>
           </a:xfrm>
           <a:prstGeom prst="rect">
             <a:avLst/>
@@ -5308,65 +5279,25 @@
           <a:lstStyle/>
           <a:p>
             <a:r>
-              <a:rPr lang="en-US" b="1" dirty="0">
-                <a:solidFill>
-                  <a:schemeClr val="bg1"/>
-                </a:solidFill>
-              </a:rPr>
-              <a:t>Run admin/management tasks as one-off processes</a:t>
-            </a:r>
-          </a:p>
-          <a:p>
-            <a:endParaRPr lang="en-US" b="1" dirty="0">
+              <a:rPr lang="en-US" b="1" dirty="0" err="1">
+                <a:solidFill>
+                  <a:schemeClr val="bg1"/>
+                </a:solidFill>
+              </a:rPr>
+              <a:t>asd</a:t>
+            </a:r>
+            <a:endParaRPr lang="en-US" dirty="0">
               <a:solidFill>
                 <a:schemeClr val="bg1"/>
               </a:solidFill>
             </a:endParaRPr>
           </a:p>
-          <a:p>
-            <a:r>
-              <a:rPr lang="en-US" b="1" dirty="0">
-                <a:solidFill>
-                  <a:schemeClr val="bg1"/>
-                </a:solidFill>
-              </a:rPr>
-              <a:t>	Run administrative and maintenance tasks separately from the app. </a:t>
-            </a:r>
-          </a:p>
-          <a:p>
-            <a:r>
-              <a:rPr lang="en-US" b="1" dirty="0">
-                <a:solidFill>
-                  <a:schemeClr val="bg1"/>
-                </a:solidFill>
-              </a:rPr>
-              <a:t>	Containers make this very easy, </a:t>
-            </a:r>
-          </a:p>
-          <a:p>
-            <a:r>
-              <a:rPr lang="en-US" b="1" dirty="0">
-                <a:solidFill>
-                  <a:schemeClr val="bg1"/>
-                </a:solidFill>
-              </a:rPr>
-              <a:t>		spin up a container just to run a task and then shut it down.</a:t>
-            </a:r>
-            <a:r>
-              <a:rPr lang="en-US" dirty="0">
-                <a:solidFill>
-                  <a:schemeClr val="bg1"/>
-                </a:solidFill>
-              </a:rPr>
-              <a:t>	</a:t>
-            </a:r>
-          </a:p>
         </p:txBody>
       </p:sp>
     </p:spTree>
     <p:extLst>
       <p:ext uri="{BB962C8B-B14F-4D97-AF65-F5344CB8AC3E}">
-        <p14:creationId xmlns:p14="http://schemas.microsoft.com/office/powerpoint/2010/main" val="3081215482"/>
+        <p14:creationId xmlns:p14="http://schemas.microsoft.com/office/powerpoint/2010/main" val="1081268966"/>
       </p:ext>
     </p:extLst>
   </p:cSld>
@@ -5488,7 +5419,7 @@
     </p:spTree>
     <p:extLst>
       <p:ext uri="{BB962C8B-B14F-4D97-AF65-F5344CB8AC3E}">
-        <p14:creationId xmlns:p14="http://schemas.microsoft.com/office/powerpoint/2010/main" val="1081268966"/>
+        <p14:creationId xmlns:p14="http://schemas.microsoft.com/office/powerpoint/2010/main" val="1678020484"/>
       </p:ext>
     </p:extLst>
   </p:cSld>
@@ -5610,7 +5541,7 @@
     </p:spTree>
     <p:extLst>
       <p:ext uri="{BB962C8B-B14F-4D97-AF65-F5344CB8AC3E}">
-        <p14:creationId xmlns:p14="http://schemas.microsoft.com/office/powerpoint/2010/main" val="1678020484"/>
+        <p14:creationId xmlns:p14="http://schemas.microsoft.com/office/powerpoint/2010/main" val="3639391312"/>
       </p:ext>
     </p:extLst>
   </p:cSld>
@@ -5675,29 +5606,13 @@
           <a:lstStyle/>
           <a:p>
             <a:r>
-              <a:rPr lang="en-US" dirty="0">
-                <a:solidFill>
-                  <a:schemeClr val="bg1"/>
-                </a:solidFill>
-                <a:latin typeface="+mn-lt"/>
-              </a:rPr>
-              <a:t> </a:t>
-            </a:r>
-            <a:r>
-              <a:rPr lang="en-US" dirty="0" err="1">
-                <a:solidFill>
-                  <a:schemeClr val="bg1"/>
-                </a:solidFill>
-                <a:latin typeface="+mn-lt"/>
-              </a:rPr>
-              <a:t>Cntd</a:t>
-            </a:r>
-            <a:endParaRPr lang="en-IN" dirty="0">
-              <a:solidFill>
-                <a:schemeClr val="bg1"/>
-              </a:solidFill>
-              <a:latin typeface="+mn-lt"/>
-            </a:endParaRPr>
+              <a:rPr lang="en-US" b="1" dirty="0">
+                <a:solidFill>
+                  <a:schemeClr val="bg1"/>
+                </a:solidFill>
+              </a:rPr>
+              <a:t>Richardson Maturity Model</a:t>
+            </a:r>
           </a:p>
         </p:txBody>
       </p:sp>
@@ -5715,8 +5630,8 @@
         </p:nvSpPr>
         <p:spPr>
           <a:xfrm>
-            <a:off x="849086" y="1779687"/>
-            <a:ext cx="10515600" cy="646331"/>
+            <a:off x="838200" y="1779687"/>
+            <a:ext cx="10515600" cy="4247317"/>
           </a:xfrm>
           <a:prstGeom prst="rect">
             <a:avLst/>
@@ -5730,21 +5645,15 @@
           <a:lstStyle/>
           <a:p>
             <a:r>
-              <a:rPr lang="en-US" b="1" dirty="0" err="1">
-                <a:solidFill>
-                  <a:schemeClr val="bg1"/>
-                </a:solidFill>
-              </a:rPr>
-              <a:t>Cntd</a:t>
-            </a:r>
-            <a:r>
-              <a:rPr lang="en-US" b="1">
-                <a:solidFill>
-                  <a:schemeClr val="bg1"/>
-                </a:solidFill>
-              </a:rPr>
-              <a:t>.</a:t>
-            </a:r>
+              <a:rPr lang="en-US" b="1" dirty="0">
+                <a:solidFill>
+                  <a:schemeClr val="bg1"/>
+                </a:solidFill>
+              </a:rPr>
+              <a:t>Need to measure the quality of Microservices implementation.</a:t>
+            </a:r>
+          </a:p>
+          <a:p>
             <a:endParaRPr lang="en-US" b="1" dirty="0">
               <a:solidFill>
                 <a:schemeClr val="bg1"/>
@@ -5753,6 +5662,124 @@
           </a:p>
           <a:p>
             <a:r>
+              <a:rPr lang="en-US" b="1" dirty="0">
+                <a:solidFill>
+                  <a:schemeClr val="bg1"/>
+                </a:solidFill>
+              </a:rPr>
+              <a:t>Richardson Maturity Model</a:t>
+            </a:r>
+          </a:p>
+          <a:p>
+            <a:pPr lvl="1"/>
+            <a:r>
+              <a:rPr lang="en-US" b="1" dirty="0">
+                <a:solidFill>
+                  <a:schemeClr val="bg1"/>
+                </a:solidFill>
+              </a:rPr>
+              <a:t>One way to measure the quality of microservices implementation.</a:t>
+            </a:r>
+          </a:p>
+          <a:p>
+            <a:r>
+              <a:rPr lang="en-US" b="1" dirty="0">
+                <a:solidFill>
+                  <a:schemeClr val="bg1"/>
+                </a:solidFill>
+              </a:rPr>
+              <a:t> </a:t>
+            </a:r>
+          </a:p>
+          <a:p>
+            <a:endParaRPr lang="en-US" b="1" dirty="0">
+              <a:solidFill>
+                <a:schemeClr val="bg1"/>
+              </a:solidFill>
+            </a:endParaRPr>
+          </a:p>
+          <a:p>
+            <a:r>
+              <a:rPr lang="en-US" b="1" dirty="0">
+                <a:solidFill>
+                  <a:schemeClr val="bg1"/>
+                </a:solidFill>
+              </a:rPr>
+              <a:t>Level 0</a:t>
+            </a:r>
+          </a:p>
+          <a:p>
+            <a:r>
+              <a:rPr lang="en-US" b="1" dirty="0">
+                <a:solidFill>
+                  <a:schemeClr val="bg1"/>
+                </a:solidFill>
+              </a:rPr>
+              <a:t>	Not a restful API</a:t>
+            </a:r>
+          </a:p>
+          <a:p>
+            <a:r>
+              <a:rPr lang="en-US" b="1" dirty="0">
+                <a:solidFill>
+                  <a:schemeClr val="bg1"/>
+                </a:solidFill>
+              </a:rPr>
+              <a:t>	URL where the REST is exposed</a:t>
+            </a:r>
+          </a:p>
+          <a:p>
+            <a:r>
+              <a:rPr lang="en-US" b="1" dirty="0">
+                <a:solidFill>
+                  <a:schemeClr val="bg1"/>
+                </a:solidFill>
+              </a:rPr>
+              <a:t>	Request body contains all details about what should happen</a:t>
+            </a:r>
+          </a:p>
+          <a:p>
+            <a:r>
+              <a:rPr lang="en-US" b="1" dirty="0">
+                <a:solidFill>
+                  <a:schemeClr val="bg1"/>
+                </a:solidFill>
+              </a:rPr>
+              <a:t>	Get, Post, Put, Delete</a:t>
+            </a:r>
+          </a:p>
+          <a:p>
+            <a:r>
+              <a:rPr lang="en-US" b="1" dirty="0">
+                <a:solidFill>
+                  <a:schemeClr val="bg1"/>
+                </a:solidFill>
+              </a:rPr>
+              <a:t>	Called Swamp of POX (Plain old xml)</a:t>
+            </a:r>
+          </a:p>
+          <a:p>
+            <a:r>
+              <a:rPr lang="en-US" b="1" dirty="0">
+                <a:solidFill>
+                  <a:schemeClr val="bg1"/>
+                </a:solidFill>
+              </a:rPr>
+              <a:t>	Everything is mentioned in xml.</a:t>
+            </a:r>
+          </a:p>
+          <a:p>
+            <a:r>
+              <a:rPr lang="en-US" b="1" dirty="0">
+                <a:solidFill>
+                  <a:schemeClr val="bg1"/>
+                </a:solidFill>
+              </a:rPr>
+              <a:t>	No http concept is used in this.</a:t>
+            </a:r>
+          </a:p>
+          <a:p>
+            <a:r>
               <a:rPr lang="en-US" dirty="0">
                 <a:solidFill>
                   <a:schemeClr val="bg1"/>
@@ -5766,7 +5793,7 @@
     </p:spTree>
     <p:extLst>
       <p:ext uri="{BB962C8B-B14F-4D97-AF65-F5344CB8AC3E}">
-        <p14:creationId xmlns:p14="http://schemas.microsoft.com/office/powerpoint/2010/main" val="1914847033"/>
+        <p14:creationId xmlns:p14="http://schemas.microsoft.com/office/powerpoint/2010/main" val="216972676"/>
       </p:ext>
     </p:extLst>
   </p:cSld>
@@ -5888,7 +5915,7 @@
     </p:spTree>
     <p:extLst>
       <p:ext uri="{BB962C8B-B14F-4D97-AF65-F5344CB8AC3E}">
-        <p14:creationId xmlns:p14="http://schemas.microsoft.com/office/powerpoint/2010/main" val="3639391312"/>
+        <p14:creationId xmlns:p14="http://schemas.microsoft.com/office/powerpoint/2010/main" val="3846244411"/>
       </p:ext>
     </p:extLst>
   </p:cSld>
@@ -6010,7 +6037,7 @@
     </p:spTree>
     <p:extLst>
       <p:ext uri="{BB962C8B-B14F-4D97-AF65-F5344CB8AC3E}">
-        <p14:creationId xmlns:p14="http://schemas.microsoft.com/office/powerpoint/2010/main" val="3846244411"/>
+        <p14:creationId xmlns:p14="http://schemas.microsoft.com/office/powerpoint/2010/main" val="3954957470"/>
       </p:ext>
     </p:extLst>
   </p:cSld>
@@ -6132,7 +6159,7 @@
     </p:spTree>
     <p:extLst>
       <p:ext uri="{BB962C8B-B14F-4D97-AF65-F5344CB8AC3E}">
-        <p14:creationId xmlns:p14="http://schemas.microsoft.com/office/powerpoint/2010/main" val="3954957470"/>
+        <p14:creationId xmlns:p14="http://schemas.microsoft.com/office/powerpoint/2010/main" val="1798581727"/>
       </p:ext>
     </p:extLst>
   </p:cSld>
@@ -6254,7 +6281,7 @@
     </p:spTree>
     <p:extLst>
       <p:ext uri="{BB962C8B-B14F-4D97-AF65-F5344CB8AC3E}">
-        <p14:creationId xmlns:p14="http://schemas.microsoft.com/office/powerpoint/2010/main" val="1798581727"/>
+        <p14:creationId xmlns:p14="http://schemas.microsoft.com/office/powerpoint/2010/main" val="20253337"/>
       </p:ext>
     </p:extLst>
   </p:cSld>
@@ -6376,7 +6403,7 @@
     </p:spTree>
     <p:extLst>
       <p:ext uri="{BB962C8B-B14F-4D97-AF65-F5344CB8AC3E}">
-        <p14:creationId xmlns:p14="http://schemas.microsoft.com/office/powerpoint/2010/main" val="20253337"/>
+        <p14:creationId xmlns:p14="http://schemas.microsoft.com/office/powerpoint/2010/main" val="4139057196"/>
       </p:ext>
     </p:extLst>
   </p:cSld>
@@ -6498,7 +6525,7 @@
     </p:spTree>
     <p:extLst>
       <p:ext uri="{BB962C8B-B14F-4D97-AF65-F5344CB8AC3E}">
-        <p14:creationId xmlns:p14="http://schemas.microsoft.com/office/powerpoint/2010/main" val="4139057196"/>
+        <p14:creationId xmlns:p14="http://schemas.microsoft.com/office/powerpoint/2010/main" val="2453228912"/>
       </p:ext>
     </p:extLst>
   </p:cSld>
@@ -6620,7 +6647,7 @@
     </p:spTree>
     <p:extLst>
       <p:ext uri="{BB962C8B-B14F-4D97-AF65-F5344CB8AC3E}">
-        <p14:creationId xmlns:p14="http://schemas.microsoft.com/office/powerpoint/2010/main" val="2453228912"/>
+        <p14:creationId xmlns:p14="http://schemas.microsoft.com/office/powerpoint/2010/main" val="3187117589"/>
       </p:ext>
     </p:extLst>
   </p:cSld>
@@ -6742,7 +6769,7 @@
     </p:spTree>
     <p:extLst>
       <p:ext uri="{BB962C8B-B14F-4D97-AF65-F5344CB8AC3E}">
-        <p14:creationId xmlns:p14="http://schemas.microsoft.com/office/powerpoint/2010/main" val="3187117589"/>
+        <p14:creationId xmlns:p14="http://schemas.microsoft.com/office/powerpoint/2010/main" val="2991810940"/>
       </p:ext>
     </p:extLst>
   </p:cSld>
@@ -6864,7 +6891,7 @@
     </p:spTree>
     <p:extLst>
       <p:ext uri="{BB962C8B-B14F-4D97-AF65-F5344CB8AC3E}">
-        <p14:creationId xmlns:p14="http://schemas.microsoft.com/office/powerpoint/2010/main" val="2991810940"/>
+        <p14:creationId xmlns:p14="http://schemas.microsoft.com/office/powerpoint/2010/main" val="936731269"/>
       </p:ext>
     </p:extLst>
   </p:cSld>
@@ -6986,7 +7013,7 @@
     </p:spTree>
     <p:extLst>
       <p:ext uri="{BB962C8B-B14F-4D97-AF65-F5344CB8AC3E}">
-        <p14:creationId xmlns:p14="http://schemas.microsoft.com/office/powerpoint/2010/main" val="936731269"/>
+        <p14:creationId xmlns:p14="http://schemas.microsoft.com/office/powerpoint/2010/main" val="1206675036"/>
       </p:ext>
     </p:extLst>
   </p:cSld>
@@ -7095,7 +7122,63 @@
                   <a:schemeClr val="bg1"/>
                 </a:solidFill>
               </a:rPr>
-              <a:t>Need to measure the quality of Microservices implementation.</a:t>
+              <a:t>Level 1</a:t>
+            </a:r>
+          </a:p>
+          <a:p>
+            <a:r>
+              <a:rPr lang="en-US" b="1" dirty="0">
+                <a:solidFill>
+                  <a:schemeClr val="bg1"/>
+                </a:solidFill>
+              </a:rPr>
+              <a:t>	Refine above with Resource URI's</a:t>
+            </a:r>
+          </a:p>
+          <a:p>
+            <a:r>
+              <a:rPr lang="en-US" b="1" dirty="0">
+                <a:solidFill>
+                  <a:schemeClr val="bg1"/>
+                </a:solidFill>
+              </a:rPr>
+              <a:t>	Message request to one URI</a:t>
+            </a:r>
+          </a:p>
+          <a:p>
+            <a:r>
+              <a:rPr lang="en-US" b="1" dirty="0">
+                <a:solidFill>
+                  <a:schemeClr val="bg1"/>
+                </a:solidFill>
+              </a:rPr>
+              <a:t>	Common to another </a:t>
+            </a:r>
+            <a:r>
+              <a:rPr lang="en-US" b="1" dirty="0" err="1">
+                <a:solidFill>
+                  <a:schemeClr val="bg1"/>
+                </a:solidFill>
+              </a:rPr>
+              <a:t>ect</a:t>
+            </a:r>
+            <a:r>
+              <a:rPr lang="en-US" b="1" dirty="0">
+                <a:solidFill>
+                  <a:schemeClr val="bg1"/>
+                </a:solidFill>
+              </a:rPr>
+              <a:t>...</a:t>
+            </a:r>
+          </a:p>
+          <a:p>
+            <a:r>
+              <a:rPr lang="en-US" b="1" dirty="0">
+                <a:solidFill>
+                  <a:schemeClr val="bg1"/>
+                </a:solidFill>
+              </a:rPr>
+              <a:t>	All information about what should happen is a part of Request Body. </a:t>
             </a:r>
           </a:p>
           <a:p>
@@ -7112,255 +7195,108 @@
                   <a:schemeClr val="bg1"/>
                 </a:solidFill>
               </a:rPr>
-              <a:t>Richardson Maturity Model</a:t>
-            </a:r>
-          </a:p>
-          <a:p>
-            <a:pPr lvl="1"/>
-            <a:r>
-              <a:rPr lang="en-US" b="1" dirty="0">
-                <a:solidFill>
-                  <a:schemeClr val="bg1"/>
-                </a:solidFill>
-              </a:rPr>
-              <a:t>One way to measure the quality of microservices implementation.</a:t>
-            </a:r>
-          </a:p>
-          <a:p>
-            <a:r>
-              <a:rPr lang="en-US" b="1" dirty="0">
-                <a:solidFill>
-                  <a:schemeClr val="bg1"/>
-                </a:solidFill>
-              </a:rPr>
-              <a:t> </a:t>
-            </a:r>
-          </a:p>
-          <a:p>
-            <a:endParaRPr lang="en-US" b="1" dirty="0">
-              <a:solidFill>
-                <a:schemeClr val="bg1"/>
-              </a:solidFill>
-            </a:endParaRPr>
-          </a:p>
-          <a:p>
-            <a:r>
-              <a:rPr lang="en-US" b="1" dirty="0">
-                <a:solidFill>
-                  <a:schemeClr val="bg1"/>
-                </a:solidFill>
-              </a:rPr>
-              <a:t>Level 0</a:t>
-            </a:r>
-          </a:p>
-          <a:p>
-            <a:r>
-              <a:rPr lang="en-US" b="1" dirty="0">
-                <a:solidFill>
-                  <a:schemeClr val="bg1"/>
-                </a:solidFill>
-              </a:rPr>
-              <a:t>	Not a restful API</a:t>
-            </a:r>
-          </a:p>
-          <a:p>
-            <a:r>
-              <a:rPr lang="en-US" b="1" dirty="0">
-                <a:solidFill>
-                  <a:schemeClr val="bg1"/>
-                </a:solidFill>
-              </a:rPr>
-              <a:t>	URL where the REST is exposed</a:t>
-            </a:r>
-          </a:p>
-          <a:p>
-            <a:r>
-              <a:rPr lang="en-US" b="1" dirty="0">
-                <a:solidFill>
-                  <a:schemeClr val="bg1"/>
-                </a:solidFill>
-              </a:rPr>
-              <a:t>	Request body contains all details about what should happen</a:t>
-            </a:r>
-          </a:p>
-          <a:p>
-            <a:r>
-              <a:rPr lang="en-US" b="1" dirty="0">
-                <a:solidFill>
-                  <a:schemeClr val="bg1"/>
-                </a:solidFill>
-              </a:rPr>
-              <a:t>	Get, Post, Put, Delete</a:t>
-            </a:r>
-          </a:p>
-          <a:p>
-            <a:r>
-              <a:rPr lang="en-US" b="1" dirty="0">
-                <a:solidFill>
-                  <a:schemeClr val="bg1"/>
-                </a:solidFill>
-              </a:rPr>
-              <a:t>	Called Swamp of POX (Plain old xml)</a:t>
-            </a:r>
-          </a:p>
-          <a:p>
-            <a:r>
-              <a:rPr lang="en-US" b="1" dirty="0">
-                <a:solidFill>
-                  <a:schemeClr val="bg1"/>
-                </a:solidFill>
-              </a:rPr>
-              <a:t>	Everything is mentioned in xml.</a:t>
-            </a:r>
-          </a:p>
-          <a:p>
-            <a:r>
-              <a:rPr lang="en-US" b="1" dirty="0">
-                <a:solidFill>
-                  <a:schemeClr val="bg1"/>
-                </a:solidFill>
-              </a:rPr>
-              <a:t>	No http concept is used in this.</a:t>
-            </a:r>
-          </a:p>
-          <a:p>
-            <a:r>
-              <a:rPr lang="en-US" dirty="0">
-                <a:solidFill>
-                  <a:schemeClr val="bg1"/>
-                </a:solidFill>
-              </a:rPr>
-              <a:t>	</a:t>
-            </a:r>
-          </a:p>
-        </p:txBody>
-      </p:sp>
-    </p:spTree>
-    <p:extLst>
-      <p:ext uri="{BB962C8B-B14F-4D97-AF65-F5344CB8AC3E}">
-        <p14:creationId xmlns:p14="http://schemas.microsoft.com/office/powerpoint/2010/main" val="216972676"/>
-      </p:ext>
-    </p:extLst>
-  </p:cSld>
-  <p:clrMapOvr>
-    <a:masterClrMapping/>
-  </p:clrMapOvr>
-</p:sld>
-</file>
-
-<file path=ppt/slides/slide30.xml><?xml version="1.0" encoding="utf-8"?>
-<p:sld xmlns:a="http://schemas.openxmlformats.org/drawingml/2006/main" xmlns:r="http://schemas.openxmlformats.org/officeDocument/2006/relationships" xmlns:p="http://schemas.openxmlformats.org/presentationml/2006/main">
-  <p:cSld>
-    <p:bg>
-      <p:bgPr>
-        <a:solidFill>
-          <a:schemeClr val="tx2">
-            <a:lumMod val="60000"/>
-            <a:lumOff val="40000"/>
-          </a:schemeClr>
-        </a:solidFill>
-        <a:effectLst/>
-      </p:bgPr>
-    </p:bg>
-    <p:spTree>
-      <p:nvGrpSpPr>
-        <p:cNvPr id="1" name=""/>
-        <p:cNvGrpSpPr/>
-        <p:nvPr/>
-      </p:nvGrpSpPr>
-      <p:grpSpPr>
-        <a:xfrm>
-          <a:off x="0" y="0"/>
-          <a:ext cx="0" cy="0"/>
-          <a:chOff x="0" y="0"/>
-          <a:chExt cx="0" cy="0"/>
-        </a:xfrm>
-      </p:grpSpPr>
-      <p:sp>
-        <p:nvSpPr>
-          <p:cNvPr id="2" name="Title 1">
-            <a:extLst>
-              <a:ext uri="{FF2B5EF4-FFF2-40B4-BE49-F238E27FC236}">
-                <a16:creationId xmlns:a16="http://schemas.microsoft.com/office/drawing/2014/main" id="{51F2C05B-3556-493B-855C-1F19ADDBAF69}"/>
-              </a:ext>
-            </a:extLst>
-          </p:cNvPr>
-          <p:cNvSpPr>
-            <a:spLocks noGrp="1"/>
-          </p:cNvSpPr>
-          <p:nvPr>
-            <p:ph type="title"/>
-          </p:nvPr>
-        </p:nvSpPr>
-        <p:spPr>
-          <a:xfrm>
-            <a:off x="838200" y="365125"/>
-            <a:ext cx="11099104" cy="1325563"/>
-          </a:xfrm>
-        </p:spPr>
-        <p:txBody>
-          <a:bodyPr/>
-          <a:lstStyle/>
-          <a:p>
-            <a:r>
-              <a:rPr lang="en-US" b="1" dirty="0">
-                <a:solidFill>
-                  <a:schemeClr val="bg1"/>
-                </a:solidFill>
-              </a:rPr>
-              <a:t>as</a:t>
-            </a:r>
-          </a:p>
-        </p:txBody>
-      </p:sp>
-      <p:sp>
-        <p:nvSpPr>
-          <p:cNvPr id="4" name="TextBox 3">
-            <a:extLst>
-              <a:ext uri="{FF2B5EF4-FFF2-40B4-BE49-F238E27FC236}">
-                <a16:creationId xmlns:a16="http://schemas.microsoft.com/office/drawing/2014/main" id="{A32609F5-383A-417E-B9B0-CE955463E2E4}"/>
-              </a:ext>
-            </a:extLst>
-          </p:cNvPr>
-          <p:cNvSpPr txBox="1"/>
-          <p:nvPr/>
-        </p:nvSpPr>
-        <p:spPr>
-          <a:xfrm>
-            <a:off x="838200" y="1779687"/>
-            <a:ext cx="10515600" cy="369332"/>
-          </a:xfrm>
-          <a:prstGeom prst="rect">
-            <a:avLst/>
-          </a:prstGeom>
-          <a:noFill/>
-        </p:spPr>
-        <p:txBody>
-          <a:bodyPr wrap="square" rtlCol="0">
-            <a:spAutoFit/>
-          </a:bodyPr>
-          <a:lstStyle/>
-          <a:p>
-            <a:r>
-              <a:rPr lang="en-US" b="1" dirty="0" err="1">
-                <a:solidFill>
-                  <a:schemeClr val="bg1"/>
-                </a:solidFill>
-              </a:rPr>
-              <a:t>asd</a:t>
-            </a:r>
+              <a:t>Level 2</a:t>
+            </a:r>
+          </a:p>
+          <a:p>
+            <a:r>
+              <a:rPr lang="en-US" b="1" dirty="0">
+                <a:solidFill>
+                  <a:schemeClr val="bg1"/>
+                </a:solidFill>
+              </a:rPr>
+              <a:t>	Different http methods for above requests</a:t>
+            </a:r>
+          </a:p>
+          <a:p>
             <a:endParaRPr lang="en-US" dirty="0">
               <a:solidFill>
                 <a:schemeClr val="bg1"/>
               </a:solidFill>
             </a:endParaRPr>
           </a:p>
+          <a:p>
+            <a:r>
+              <a:rPr lang="en-US" b="1" dirty="0">
+                <a:solidFill>
+                  <a:schemeClr val="bg1"/>
+                </a:solidFill>
+              </a:rPr>
+              <a:t>Level 3</a:t>
+            </a:r>
+          </a:p>
+          <a:p>
+            <a:r>
+              <a:rPr lang="en-US" b="1" dirty="0">
+                <a:solidFill>
+                  <a:schemeClr val="bg1"/>
+                </a:solidFill>
+              </a:rPr>
+              <a:t>	HATEOAS</a:t>
+            </a:r>
+          </a:p>
+          <a:p>
+            <a:r>
+              <a:rPr lang="en-US" b="1" dirty="0">
+                <a:solidFill>
+                  <a:schemeClr val="bg1"/>
+                </a:solidFill>
+              </a:rPr>
+              <a:t>		Response have links that the client can use.</a:t>
+            </a:r>
+          </a:p>
+          <a:p>
+            <a:r>
+              <a:rPr lang="en-US" b="1" dirty="0">
+                <a:solidFill>
+                  <a:schemeClr val="bg1"/>
+                </a:solidFill>
+              </a:rPr>
+              <a:t>		Similar to real websites. </a:t>
+            </a:r>
+          </a:p>
+          <a:p>
+            <a:r>
+              <a:rPr lang="en-US" b="1" dirty="0">
+                <a:solidFill>
+                  <a:schemeClr val="bg1"/>
+                </a:solidFill>
+              </a:rPr>
+              <a:t>		We just know the homepage everything else is followed through links/buttons.</a:t>
+            </a:r>
+          </a:p>
+          <a:p>
+            <a:r>
+              <a:rPr lang="en-US" b="1" dirty="0">
+                <a:solidFill>
+                  <a:schemeClr val="bg1"/>
+                </a:solidFill>
+              </a:rPr>
+              <a:t>		Client doesn't need to remember what the </a:t>
+            </a:r>
+            <a:r>
+              <a:rPr lang="en-US" b="1" dirty="0" err="1">
+                <a:solidFill>
+                  <a:schemeClr val="bg1"/>
+                </a:solidFill>
+              </a:rPr>
+              <a:t>url's</a:t>
+            </a:r>
+            <a:r>
+              <a:rPr lang="en-US" b="1" dirty="0">
+                <a:solidFill>
+                  <a:schemeClr val="bg1"/>
+                </a:solidFill>
+              </a:rPr>
+              <a:t> are.</a:t>
+            </a:r>
+          </a:p>
         </p:txBody>
       </p:sp>
     </p:spTree>
     <p:extLst>
       <p:ext uri="{BB962C8B-B14F-4D97-AF65-F5344CB8AC3E}">
-        <p14:creationId xmlns:p14="http://schemas.microsoft.com/office/powerpoint/2010/main" val="1206675036"/>
+        <p14:creationId xmlns:p14="http://schemas.microsoft.com/office/powerpoint/2010/main" val="1050218805"/>
       </p:ext>
     </p:extLst>
   </p:cSld>
@@ -7430,7 +7366,7 @@
                   <a:schemeClr val="bg1"/>
                 </a:solidFill>
               </a:rPr>
-              <a:t>Richardson Maturity Model</a:t>
+              <a:t>12 Factor applications</a:t>
             </a:r>
           </a:p>
         </p:txBody>
@@ -7450,7 +7386,7 @@
         <p:spPr>
           <a:xfrm>
             <a:off x="838200" y="1779687"/>
-            <a:ext cx="10515600" cy="4247317"/>
+            <a:ext cx="10515600" cy="369332"/>
           </a:xfrm>
           <a:prstGeom prst="rect">
             <a:avLst/>
@@ -7469,173 +7405,7 @@
                   <a:schemeClr val="bg1"/>
                 </a:solidFill>
               </a:rPr>
-              <a:t>Level 1</a:t>
-            </a:r>
-          </a:p>
-          <a:p>
-            <a:r>
-              <a:rPr lang="en-US" b="1" dirty="0">
-                <a:solidFill>
-                  <a:schemeClr val="bg1"/>
-                </a:solidFill>
-              </a:rPr>
-              <a:t>	Refine above with Resource URI's</a:t>
-            </a:r>
-          </a:p>
-          <a:p>
-            <a:r>
-              <a:rPr lang="en-US" b="1" dirty="0">
-                <a:solidFill>
-                  <a:schemeClr val="bg1"/>
-                </a:solidFill>
-              </a:rPr>
-              <a:t>	Message request to one URI</a:t>
-            </a:r>
-          </a:p>
-          <a:p>
-            <a:r>
-              <a:rPr lang="en-US" b="1" dirty="0">
-                <a:solidFill>
-                  <a:schemeClr val="bg1"/>
-                </a:solidFill>
-              </a:rPr>
-              <a:t>	Common to another </a:t>
-            </a:r>
-            <a:r>
-              <a:rPr lang="en-US" b="1" dirty="0" err="1">
-                <a:solidFill>
-                  <a:schemeClr val="bg1"/>
-                </a:solidFill>
-              </a:rPr>
-              <a:t>ect</a:t>
-            </a:r>
-            <a:r>
-              <a:rPr lang="en-US" b="1" dirty="0">
-                <a:solidFill>
-                  <a:schemeClr val="bg1"/>
-                </a:solidFill>
-              </a:rPr>
-              <a:t>...</a:t>
-            </a:r>
-          </a:p>
-          <a:p>
-            <a:r>
-              <a:rPr lang="en-US" b="1" dirty="0">
-                <a:solidFill>
-                  <a:schemeClr val="bg1"/>
-                </a:solidFill>
-              </a:rPr>
-              <a:t>	All information about what should happen is a part of Request Body. </a:t>
-            </a:r>
-          </a:p>
-          <a:p>
-            <a:endParaRPr lang="en-US" b="1" dirty="0">
-              <a:solidFill>
-                <a:schemeClr val="bg1"/>
-              </a:solidFill>
-            </a:endParaRPr>
-          </a:p>
-          <a:p>
-            <a:r>
-              <a:rPr lang="en-US" b="1" dirty="0">
-                <a:solidFill>
-                  <a:schemeClr val="bg1"/>
-                </a:solidFill>
-              </a:rPr>
-              <a:t>Level 2</a:t>
-            </a:r>
-          </a:p>
-          <a:p>
-            <a:r>
-              <a:rPr lang="en-US" b="1" dirty="0">
-                <a:solidFill>
-                  <a:schemeClr val="bg1"/>
-                </a:solidFill>
-              </a:rPr>
-              <a:t>	Different http methods for above requests</a:t>
-            </a:r>
-          </a:p>
-          <a:p>
-            <a:endParaRPr lang="en-US" dirty="0">
-              <a:solidFill>
-                <a:schemeClr val="bg1"/>
-              </a:solidFill>
-            </a:endParaRPr>
-          </a:p>
-          <a:p>
-            <a:r>
-              <a:rPr lang="en-US" b="1" dirty="0">
-                <a:solidFill>
-                  <a:schemeClr val="bg1"/>
-                </a:solidFill>
-              </a:rPr>
-              <a:t>Level 3</a:t>
-            </a:r>
-          </a:p>
-          <a:p>
-            <a:r>
-              <a:rPr lang="en-US" b="1" dirty="0">
-                <a:solidFill>
-                  <a:schemeClr val="bg1"/>
-                </a:solidFill>
-              </a:rPr>
-              <a:t>	HATEOAS</a:t>
-            </a:r>
-          </a:p>
-          <a:p>
-            <a:r>
-              <a:rPr lang="en-US" b="1" dirty="0">
-                <a:solidFill>
-                  <a:schemeClr val="bg1"/>
-                </a:solidFill>
-              </a:rPr>
-              <a:t>		Response have links that the client can use.</a:t>
-            </a:r>
-          </a:p>
-          <a:p>
-            <a:r>
-              <a:rPr lang="en-US" b="1" dirty="0">
-                <a:solidFill>
-                  <a:schemeClr val="bg1"/>
-                </a:solidFill>
-              </a:rPr>
-              <a:t>		Similar to real websites. </a:t>
-            </a:r>
-          </a:p>
-          <a:p>
-            <a:r>
-              <a:rPr lang="en-US" b="1" dirty="0">
-                <a:solidFill>
-                  <a:schemeClr val="bg1"/>
-                </a:solidFill>
-              </a:rPr>
-              <a:t>		We just know the homepage everything else is followed through links/buttons.</a:t>
-            </a:r>
-          </a:p>
-          <a:p>
-            <a:r>
-              <a:rPr lang="en-US" b="1" dirty="0">
-                <a:solidFill>
-                  <a:schemeClr val="bg1"/>
-                </a:solidFill>
-              </a:rPr>
-              <a:t>		Client doesn't need to remember what the </a:t>
-            </a:r>
-            <a:r>
-              <a:rPr lang="en-US" b="1" dirty="0" err="1">
-                <a:solidFill>
-                  <a:schemeClr val="bg1"/>
-                </a:solidFill>
-              </a:rPr>
-              <a:t>url's</a:t>
-            </a:r>
-            <a:r>
-              <a:rPr lang="en-US" b="1" dirty="0">
-                <a:solidFill>
-                  <a:schemeClr val="bg1"/>
-                </a:solidFill>
-              </a:rPr>
-              <a:t> are.</a:t>
+              <a:t>12 recommendations widely accepted and popular among microservices community</a:t>
             </a:r>
           </a:p>
         </p:txBody>
@@ -7643,7 +7413,7 @@
     </p:spTree>
     <p:extLst>
       <p:ext uri="{BB962C8B-B14F-4D97-AF65-F5344CB8AC3E}">
-        <p14:creationId xmlns:p14="http://schemas.microsoft.com/office/powerpoint/2010/main" val="1050218805"/>
+        <p14:creationId xmlns:p14="http://schemas.microsoft.com/office/powerpoint/2010/main" val="2674207750"/>
       </p:ext>
     </p:extLst>
   </p:cSld>
@@ -7713,7 +7483,7 @@
                   <a:schemeClr val="bg1"/>
                 </a:solidFill>
               </a:rPr>
-              <a:t>12 Factor applications</a:t>
+              <a:t>I. Codebase</a:t>
             </a:r>
           </a:p>
         </p:txBody>
@@ -7733,7 +7503,7 @@
         <p:spPr>
           <a:xfrm>
             <a:off x="838200" y="1779687"/>
-            <a:ext cx="10515600" cy="369332"/>
+            <a:ext cx="10515600" cy="2862322"/>
           </a:xfrm>
           <a:prstGeom prst="rect">
             <a:avLst/>
@@ -7752,7 +7522,97 @@
                   <a:schemeClr val="bg1"/>
                 </a:solidFill>
               </a:rPr>
-              <a:t>12 recommendations widely accepted and popular among microservices community</a:t>
+              <a:t>One codebase tracked in revision control, many deploys</a:t>
+            </a:r>
+          </a:p>
+          <a:p>
+            <a:r>
+              <a:rPr lang="en-US" b="1" dirty="0">
+                <a:solidFill>
+                  <a:schemeClr val="bg1"/>
+                </a:solidFill>
+              </a:rPr>
+              <a:t>	Recommends one codebase per app. </a:t>
+            </a:r>
+          </a:p>
+          <a:p>
+            <a:r>
+              <a:rPr lang="en-US" b="1" dirty="0">
+                <a:solidFill>
+                  <a:schemeClr val="bg1"/>
+                </a:solidFill>
+              </a:rPr>
+              <a:t>	Microservices architecture, </a:t>
+            </a:r>
+          </a:p>
+          <a:p>
+            <a:r>
+              <a:rPr lang="en-US" b="1" dirty="0">
+                <a:solidFill>
+                  <a:schemeClr val="bg1"/>
+                </a:solidFill>
+              </a:rPr>
+              <a:t>		one codebase per service. </a:t>
+            </a:r>
+          </a:p>
+          <a:p>
+            <a:r>
+              <a:rPr lang="en-US" b="1" dirty="0">
+                <a:solidFill>
+                  <a:schemeClr val="bg1"/>
+                </a:solidFill>
+              </a:rPr>
+              <a:t>	Generally (kind of a recommendation)</a:t>
+            </a:r>
+          </a:p>
+          <a:p>
+            <a:r>
+              <a:rPr lang="en-US" b="1" dirty="0">
+                <a:solidFill>
+                  <a:schemeClr val="bg1"/>
+                </a:solidFill>
+              </a:rPr>
+              <a:t>		Git as a repository, </a:t>
+            </a:r>
+          </a:p>
+          <a:p>
+            <a:r>
+              <a:rPr lang="en-US" b="1" dirty="0">
+                <a:solidFill>
+                  <a:schemeClr val="bg1"/>
+                </a:solidFill>
+              </a:rPr>
+              <a:t>		rich feature set and enormous ecosystem. </a:t>
+            </a:r>
+          </a:p>
+          <a:p>
+            <a:r>
+              <a:rPr lang="en-US" b="1" dirty="0">
+                <a:solidFill>
+                  <a:schemeClr val="bg1"/>
+                </a:solidFill>
+              </a:rPr>
+              <a:t>	GitHub </a:t>
+            </a:r>
+          </a:p>
+          <a:p>
+            <a:r>
+              <a:rPr lang="en-US" b="1" dirty="0">
+                <a:solidFill>
+                  <a:schemeClr val="bg1"/>
+                </a:solidFill>
+              </a:rPr>
+              <a:t>		default Git hosting platform in the open source community</a:t>
+            </a:r>
+          </a:p>
+          <a:p>
+            <a:r>
+              <a:rPr lang="en-US" b="1" dirty="0">
+                <a:solidFill>
+                  <a:schemeClr val="bg1"/>
+                </a:solidFill>
+              </a:rPr>
+              <a:t>		Similar other options are also acceptable.</a:t>
             </a:r>
           </a:p>
         </p:txBody>
@@ -7760,7 +7620,7 @@
     </p:spTree>
     <p:extLst>
       <p:ext uri="{BB962C8B-B14F-4D97-AF65-F5344CB8AC3E}">
-        <p14:creationId xmlns:p14="http://schemas.microsoft.com/office/powerpoint/2010/main" val="2674207750"/>
+        <p14:creationId xmlns:p14="http://schemas.microsoft.com/office/powerpoint/2010/main" val="902312026"/>
       </p:ext>
     </p:extLst>
   </p:cSld>
@@ -7830,7 +7690,7 @@
                   <a:schemeClr val="bg1"/>
                 </a:solidFill>
               </a:rPr>
-              <a:t>I. Codebase</a:t>
+              <a:t>II. Dependencies</a:t>
             </a:r>
           </a:p>
         </p:txBody>
@@ -7869,97 +7729,110 @@
                   <a:schemeClr val="bg1"/>
                 </a:solidFill>
               </a:rPr>
-              <a:t>One codebase tracked in revision control, many deploys</a:t>
-            </a:r>
-          </a:p>
-          <a:p>
-            <a:r>
-              <a:rPr lang="en-US" b="1" dirty="0">
-                <a:solidFill>
-                  <a:schemeClr val="bg1"/>
-                </a:solidFill>
-              </a:rPr>
-              <a:t>	Recommends one codebase per app. </a:t>
-            </a:r>
-          </a:p>
-          <a:p>
-            <a:r>
-              <a:rPr lang="en-US" b="1" dirty="0">
-                <a:solidFill>
-                  <a:schemeClr val="bg1"/>
-                </a:solidFill>
-              </a:rPr>
-              <a:t>	Microservices architecture, </a:t>
-            </a:r>
-          </a:p>
-          <a:p>
-            <a:r>
-              <a:rPr lang="en-US" b="1" dirty="0">
-                <a:solidFill>
-                  <a:schemeClr val="bg1"/>
-                </a:solidFill>
-              </a:rPr>
-              <a:t>		one codebase per service. </a:t>
-            </a:r>
-          </a:p>
-          <a:p>
-            <a:r>
-              <a:rPr lang="en-US" b="1" dirty="0">
-                <a:solidFill>
-                  <a:schemeClr val="bg1"/>
-                </a:solidFill>
-              </a:rPr>
-              <a:t>	Generally (kind of a recommendation)</a:t>
-            </a:r>
-          </a:p>
-          <a:p>
-            <a:r>
-              <a:rPr lang="en-US" b="1" dirty="0">
-                <a:solidFill>
-                  <a:schemeClr val="bg1"/>
-                </a:solidFill>
-              </a:rPr>
-              <a:t>		Git as a repository, </a:t>
-            </a:r>
-          </a:p>
-          <a:p>
-            <a:r>
-              <a:rPr lang="en-US" b="1" dirty="0">
-                <a:solidFill>
-                  <a:schemeClr val="bg1"/>
-                </a:solidFill>
-              </a:rPr>
-              <a:t>		rich feature set and enormous ecosystem. </a:t>
-            </a:r>
-          </a:p>
-          <a:p>
-            <a:r>
-              <a:rPr lang="en-US" b="1" dirty="0">
-                <a:solidFill>
-                  <a:schemeClr val="bg1"/>
-                </a:solidFill>
-              </a:rPr>
-              <a:t>	GitHub </a:t>
-            </a:r>
-          </a:p>
-          <a:p>
-            <a:r>
-              <a:rPr lang="en-US" b="1" dirty="0">
-                <a:solidFill>
-                  <a:schemeClr val="bg1"/>
-                </a:solidFill>
-              </a:rPr>
-              <a:t>		default Git hosting platform in the open source community</a:t>
-            </a:r>
-          </a:p>
-          <a:p>
-            <a:r>
-              <a:rPr lang="en-US" b="1" dirty="0">
-                <a:solidFill>
-                  <a:schemeClr val="bg1"/>
-                </a:solidFill>
-              </a:rPr>
-              <a:t>		Similar other options are also acceptable.</a:t>
+              <a:t>Explicitly declare and isolate dependencies</a:t>
+            </a:r>
+          </a:p>
+          <a:p>
+            <a:r>
+              <a:rPr lang="en-US" b="1" dirty="0">
+                <a:solidFill>
+                  <a:schemeClr val="bg1"/>
+                </a:solidFill>
+              </a:rPr>
+              <a:t>	regardless of platform </a:t>
+            </a:r>
+          </a:p>
+          <a:p>
+            <a:r>
+              <a:rPr lang="en-US" b="1" dirty="0">
+                <a:solidFill>
+                  <a:schemeClr val="bg1"/>
+                </a:solidFill>
+              </a:rPr>
+              <a:t>		use the dependency manager. </a:t>
+            </a:r>
+          </a:p>
+          <a:p>
+            <a:endParaRPr lang="en-US" b="1" dirty="0">
+              <a:solidFill>
+                <a:schemeClr val="bg1"/>
+              </a:solidFill>
+            </a:endParaRPr>
+          </a:p>
+          <a:p>
+            <a:r>
+              <a:rPr lang="en-US" b="1" dirty="0">
+                <a:solidFill>
+                  <a:schemeClr val="bg1"/>
+                </a:solidFill>
+              </a:rPr>
+              <a:t>	Noncontainerized environments, </a:t>
+            </a:r>
+          </a:p>
+          <a:p>
+            <a:r>
+              <a:rPr lang="en-US" b="1" dirty="0">
+                <a:solidFill>
+                  <a:schemeClr val="bg1"/>
+                </a:solidFill>
+              </a:rPr>
+              <a:t>		use a configuration management tool </a:t>
+            </a:r>
+          </a:p>
+          <a:p>
+            <a:r>
+              <a:rPr lang="en-US" b="1" dirty="0">
+                <a:solidFill>
+                  <a:schemeClr val="bg1"/>
+                </a:solidFill>
+              </a:rPr>
+              <a:t>		e.g. Chef, Puppet, Ansible</a:t>
+            </a:r>
+          </a:p>
+          <a:p>
+            <a:r>
+              <a:rPr lang="en-US" b="1" dirty="0">
+                <a:solidFill>
+                  <a:schemeClr val="bg1"/>
+                </a:solidFill>
+              </a:rPr>
+              <a:t>	Containerized environment, </a:t>
+            </a:r>
+          </a:p>
+          <a:p>
+            <a:r>
+              <a:rPr lang="en-US" b="1" dirty="0">
+                <a:solidFill>
+                  <a:schemeClr val="bg1"/>
+                </a:solidFill>
+              </a:rPr>
+              <a:t>		do it in </a:t>
+            </a:r>
+            <a:r>
+              <a:rPr lang="en-US" b="1" dirty="0" err="1">
+                <a:solidFill>
+                  <a:schemeClr val="bg1"/>
+                </a:solidFill>
+              </a:rPr>
+              <a:t>Dockerfile</a:t>
+            </a:r>
+            <a:r>
+              <a:rPr lang="en-US" b="1" dirty="0">
+                <a:solidFill>
+                  <a:schemeClr val="bg1"/>
+                </a:solidFill>
+              </a:rPr>
+              <a:t>.</a:t>
+            </a:r>
+          </a:p>
+          <a:p>
+            <a:r>
+              <a:rPr lang="en-US" dirty="0">
+                <a:solidFill>
+                  <a:schemeClr val="bg1"/>
+                </a:solidFill>
+              </a:rPr>
+              <a:t>	</a:t>
             </a:r>
           </a:p>
         </p:txBody>
@@ -7967,7 +7840,7 @@
     </p:spTree>
     <p:extLst>
       <p:ext uri="{BB962C8B-B14F-4D97-AF65-F5344CB8AC3E}">
-        <p14:creationId xmlns:p14="http://schemas.microsoft.com/office/powerpoint/2010/main" val="902312026"/>
+        <p14:creationId xmlns:p14="http://schemas.microsoft.com/office/powerpoint/2010/main" val="3019538096"/>
       </p:ext>
     </p:extLst>
   </p:cSld>
@@ -8037,7 +7910,7 @@
                   <a:schemeClr val="bg1"/>
                 </a:solidFill>
               </a:rPr>
-              <a:t>II. Dependencies</a:t>
+              <a:t>III. Config</a:t>
             </a:r>
           </a:p>
         </p:txBody>
@@ -8057,7 +7930,7 @@
         <p:spPr>
           <a:xfrm>
             <a:off x="838200" y="1779687"/>
-            <a:ext cx="10515600" cy="2862322"/>
+            <a:ext cx="10515600" cy="2585323"/>
           </a:xfrm>
           <a:prstGeom prst="rect">
             <a:avLst/>
@@ -8076,27 +7949,57 @@
                   <a:schemeClr val="bg1"/>
                 </a:solidFill>
               </a:rPr>
-              <a:t>Explicitly declare and isolate dependencies</a:t>
-            </a:r>
-          </a:p>
-          <a:p>
-            <a:r>
-              <a:rPr lang="en-US" b="1" dirty="0">
-                <a:solidFill>
-                  <a:schemeClr val="bg1"/>
-                </a:solidFill>
-              </a:rPr>
-              <a:t>	regardless of platform </a:t>
-            </a:r>
-          </a:p>
-          <a:p>
-            <a:r>
-              <a:rPr lang="en-US" b="1" dirty="0">
-                <a:solidFill>
-                  <a:schemeClr val="bg1"/>
-                </a:solidFill>
-              </a:rPr>
-              <a:t>		use the dependency manager. </a:t>
+              <a:t>Store config in the environment</a:t>
+            </a:r>
+          </a:p>
+          <a:p>
+            <a:r>
+              <a:rPr lang="en-US" b="1" dirty="0">
+                <a:solidFill>
+                  <a:schemeClr val="bg1"/>
+                </a:solidFill>
+              </a:rPr>
+              <a:t>	configuration: Anything that varies between deployments</a:t>
+            </a:r>
+          </a:p>
+          <a:p>
+            <a:r>
+              <a:rPr lang="en-US" b="1" dirty="0">
+                <a:solidFill>
+                  <a:schemeClr val="bg1"/>
+                </a:solidFill>
+              </a:rPr>
+              <a:t>	Store all configuration in the environment</a:t>
+            </a:r>
+          </a:p>
+          <a:p>
+            <a:r>
+              <a:rPr lang="en-US" b="1" dirty="0">
+                <a:solidFill>
+                  <a:schemeClr val="bg1"/>
+                </a:solidFill>
+              </a:rPr>
+              <a:t>	Related standard and recommendation for Docker/Containers</a:t>
+            </a:r>
+          </a:p>
+          <a:p>
+            <a:r>
+              <a:rPr lang="en-US" b="1" dirty="0">
+                <a:solidFill>
+                  <a:schemeClr val="bg1"/>
+                </a:solidFill>
+              </a:rPr>
+              <a:t>		Use non version controlled .env files for local development. </a:t>
+            </a:r>
+          </a:p>
+          <a:p>
+            <a:r>
+              <a:rPr lang="en-US" b="1" dirty="0">
+                <a:solidFill>
+                  <a:schemeClr val="bg1"/>
+                </a:solidFill>
+              </a:rPr>
+              <a:t>		Docker supports the loading of these files at runtime.</a:t>
             </a:r>
           </a:p>
           <a:p>
@@ -8107,70 +8010,11 @@
             </a:endParaRPr>
           </a:p>
           <a:p>
-            <a:r>
-              <a:rPr lang="en-US" b="1" dirty="0">
-                <a:solidFill>
-                  <a:schemeClr val="bg1"/>
-                </a:solidFill>
-              </a:rPr>
-              <a:t>	Noncontainerized environments, </a:t>
-            </a:r>
-          </a:p>
-          <a:p>
-            <a:r>
-              <a:rPr lang="en-US" b="1" dirty="0">
-                <a:solidFill>
-                  <a:schemeClr val="bg1"/>
-                </a:solidFill>
-              </a:rPr>
-              <a:t>		use a configuration management tool </a:t>
-            </a:r>
-          </a:p>
-          <a:p>
-            <a:r>
-              <a:rPr lang="en-US" b="1" dirty="0">
-                <a:solidFill>
-                  <a:schemeClr val="bg1"/>
-                </a:solidFill>
-              </a:rPr>
-              <a:t>		e.g. Chef, Puppet, Ansible</a:t>
-            </a:r>
-          </a:p>
-          <a:p>
-            <a:r>
-              <a:rPr lang="en-US" b="1" dirty="0">
-                <a:solidFill>
-                  <a:schemeClr val="bg1"/>
-                </a:solidFill>
-              </a:rPr>
-              <a:t>	Containerized environment, </a:t>
-            </a:r>
-          </a:p>
-          <a:p>
-            <a:r>
-              <a:rPr lang="en-US" b="1" dirty="0">
-                <a:solidFill>
-                  <a:schemeClr val="bg1"/>
-                </a:solidFill>
-              </a:rPr>
-              <a:t>		do it in </a:t>
-            </a:r>
-            <a:r>
-              <a:rPr lang="en-US" b="1" dirty="0" err="1">
-                <a:solidFill>
-                  <a:schemeClr val="bg1"/>
-                </a:solidFill>
-              </a:rPr>
-              <a:t>Dockerfile</a:t>
-            </a:r>
-            <a:r>
-              <a:rPr lang="en-US" b="1" dirty="0">
-                <a:solidFill>
-                  <a:schemeClr val="bg1"/>
-                </a:solidFill>
-              </a:rPr>
-              <a:t>.</a:t>
-            </a:r>
+            <a:endParaRPr lang="en-US" b="1" dirty="0">
+              <a:solidFill>
+                <a:schemeClr val="bg1"/>
+              </a:solidFill>
+            </a:endParaRPr>
           </a:p>
           <a:p>
             <a:r>
@@ -8187,7 +8031,7 @@
     </p:spTree>
     <p:extLst>
       <p:ext uri="{BB962C8B-B14F-4D97-AF65-F5344CB8AC3E}">
-        <p14:creationId xmlns:p14="http://schemas.microsoft.com/office/powerpoint/2010/main" val="3019538096"/>
+        <p14:creationId xmlns:p14="http://schemas.microsoft.com/office/powerpoint/2010/main" val="653758472"/>
       </p:ext>
     </p:extLst>
   </p:cSld>
@@ -8257,7 +8101,7 @@
                   <a:schemeClr val="bg1"/>
                 </a:solidFill>
               </a:rPr>
-              <a:t>III. Config</a:t>
+              <a:t>IV. Backing services</a:t>
             </a:r>
           </a:p>
         </p:txBody>
@@ -8277,7 +8121,7 @@
         <p:spPr>
           <a:xfrm>
             <a:off x="838200" y="1779687"/>
-            <a:ext cx="10515600" cy="2585323"/>
+            <a:ext cx="10515600" cy="3693319"/>
           </a:xfrm>
           <a:prstGeom prst="rect">
             <a:avLst/>
@@ -8296,57 +8140,7 @@
                   <a:schemeClr val="bg1"/>
                 </a:solidFill>
               </a:rPr>
-              <a:t>Store config in the environment</a:t>
-            </a:r>
-          </a:p>
-          <a:p>
-            <a:r>
-              <a:rPr lang="en-US" b="1" dirty="0">
-                <a:solidFill>
-                  <a:schemeClr val="bg1"/>
-                </a:solidFill>
-              </a:rPr>
-              <a:t>	configuration: Anything that varies between deployments</a:t>
-            </a:r>
-          </a:p>
-          <a:p>
-            <a:r>
-              <a:rPr lang="en-US" b="1" dirty="0">
-                <a:solidFill>
-                  <a:schemeClr val="bg1"/>
-                </a:solidFill>
-              </a:rPr>
-              <a:t>	Store all configuration in the environment</a:t>
-            </a:r>
-          </a:p>
-          <a:p>
-            <a:r>
-              <a:rPr lang="en-US" b="1" dirty="0">
-                <a:solidFill>
-                  <a:schemeClr val="bg1"/>
-                </a:solidFill>
-              </a:rPr>
-              <a:t>	Related standard and recommendation for Docker/Containers</a:t>
-            </a:r>
-          </a:p>
-          <a:p>
-            <a:r>
-              <a:rPr lang="en-US" b="1" dirty="0">
-                <a:solidFill>
-                  <a:schemeClr val="bg1"/>
-                </a:solidFill>
-              </a:rPr>
-              <a:t>		Use non version controlled .env files for local development. </a:t>
-            </a:r>
-          </a:p>
-          <a:p>
-            <a:r>
-              <a:rPr lang="en-US" b="1" dirty="0">
-                <a:solidFill>
-                  <a:schemeClr val="bg1"/>
-                </a:solidFill>
-              </a:rPr>
-              <a:t>		Docker supports the loading of these files at runtime.</a:t>
+              <a:t>Treat backing services as attached resources</a:t>
             </a:r>
           </a:p>
           <a:p>
@@ -8357,11 +8151,120 @@
             </a:endParaRPr>
           </a:p>
           <a:p>
-            <a:endParaRPr lang="en-US" b="1" dirty="0">
-              <a:solidFill>
-                <a:schemeClr val="bg1"/>
-              </a:solidFill>
-            </a:endParaRPr>
+            <a:r>
+              <a:rPr lang="en-US" b="1" dirty="0">
+                <a:solidFill>
+                  <a:schemeClr val="bg1"/>
+                </a:solidFill>
+              </a:rPr>
+              <a:t>	backing service: “any service the app consumes over the network as part of its normal operation.” </a:t>
+            </a:r>
+          </a:p>
+          <a:p>
+            <a:r>
+              <a:rPr lang="en-US" b="1" dirty="0">
+                <a:solidFill>
+                  <a:schemeClr val="bg1"/>
+                </a:solidFill>
+              </a:rPr>
+              <a:t>	Implication: </a:t>
+            </a:r>
+          </a:p>
+          <a:p>
+            <a:r>
+              <a:rPr lang="en-US" b="1" dirty="0">
+                <a:solidFill>
+                  <a:schemeClr val="bg1"/>
+                </a:solidFill>
+              </a:rPr>
+              <a:t>		Anything external to a service is an attached resource, </a:t>
+            </a:r>
+          </a:p>
+          <a:p>
+            <a:r>
+              <a:rPr lang="en-US" b="1" dirty="0">
+                <a:solidFill>
+                  <a:schemeClr val="bg1"/>
+                </a:solidFill>
+              </a:rPr>
+              <a:t>			e.g. including other services. </a:t>
+            </a:r>
+          </a:p>
+          <a:p>
+            <a:r>
+              <a:rPr lang="en-US" b="1" dirty="0">
+                <a:solidFill>
+                  <a:schemeClr val="bg1"/>
+                </a:solidFill>
+              </a:rPr>
+              <a:t>Adv.</a:t>
+            </a:r>
+          </a:p>
+          <a:p>
+            <a:r>
+              <a:rPr lang="en-US" b="1" dirty="0">
+                <a:solidFill>
+                  <a:schemeClr val="bg1"/>
+                </a:solidFill>
+              </a:rPr>
+              <a:t>	every service is </a:t>
+            </a:r>
+          </a:p>
+          <a:p>
+            <a:r>
+              <a:rPr lang="en-US" b="1" dirty="0">
+                <a:solidFill>
+                  <a:schemeClr val="bg1"/>
+                </a:solidFill>
+              </a:rPr>
+              <a:t>		Completely portable </a:t>
+            </a:r>
+          </a:p>
+          <a:p>
+            <a:r>
+              <a:rPr lang="en-US" b="1" dirty="0">
+                <a:solidFill>
+                  <a:schemeClr val="bg1"/>
+                </a:solidFill>
+              </a:rPr>
+              <a:t>		Loosely coupled </a:t>
+            </a:r>
+          </a:p>
+          <a:p>
+            <a:r>
+              <a:rPr lang="en-US" b="1" dirty="0">
+                <a:solidFill>
+                  <a:schemeClr val="bg1"/>
+                </a:solidFill>
+              </a:rPr>
+              <a:t>		Strict separation increases flexibility </a:t>
+            </a:r>
+          </a:p>
+          <a:p>
+            <a:r>
+              <a:rPr lang="en-US" b="1" dirty="0">
+                <a:solidFill>
+                  <a:schemeClr val="bg1"/>
+                </a:solidFill>
+              </a:rPr>
+              <a:t>		dev. </a:t>
+            </a:r>
+            <a:r>
+              <a:rPr lang="en-US" b="1" dirty="0" err="1">
+                <a:solidFill>
+                  <a:schemeClr val="bg1"/>
+                </a:solidFill>
+              </a:rPr>
+              <a:t>engg</a:t>
+            </a:r>
+            <a:r>
+              <a:rPr lang="en-US" b="1" dirty="0">
+                <a:solidFill>
+                  <a:schemeClr val="bg1"/>
+                </a:solidFill>
+              </a:rPr>
+              <a:t>. only need to run the service(s) they are modifying, not others.</a:t>
+            </a:r>
           </a:p>
           <a:p>
             <a:r>
@@ -8378,7 +8281,7 @@
     </p:spTree>
     <p:extLst>
       <p:ext uri="{BB962C8B-B14F-4D97-AF65-F5344CB8AC3E}">
-        <p14:creationId xmlns:p14="http://schemas.microsoft.com/office/powerpoint/2010/main" val="653758472"/>
+        <p14:creationId xmlns:p14="http://schemas.microsoft.com/office/powerpoint/2010/main" val="559799029"/>
       </p:ext>
     </p:extLst>
   </p:cSld>
@@ -8448,7 +8351,7 @@
                   <a:schemeClr val="bg1"/>
                 </a:solidFill>
               </a:rPr>
-              <a:t>IV. Backing services</a:t>
+              <a:t>V. Build, release, run</a:t>
             </a:r>
           </a:p>
         </p:txBody>
@@ -8468,7 +8371,7 @@
         <p:spPr>
           <a:xfrm>
             <a:off x="838200" y="1779687"/>
-            <a:ext cx="10515600" cy="3693319"/>
+            <a:ext cx="10515600" cy="2031325"/>
           </a:xfrm>
           <a:prstGeom prst="rect">
             <a:avLst/>
@@ -8487,7 +8390,7 @@
                   <a:schemeClr val="bg1"/>
                 </a:solidFill>
               </a:rPr>
-              <a:t>Treat backing services as attached resources</a:t>
+              <a:t>Strictly separate build and run stages</a:t>
             </a:r>
           </a:p>
           <a:p>
@@ -8504,97 +8407,7 @@
                   <a:schemeClr val="bg1"/>
                 </a:solidFill>
               </a:rPr>
-              <a:t>	backing service: “any service the app consumes over the network as part of its normal operation.” </a:t>
-            </a:r>
-          </a:p>
-          <a:p>
-            <a:r>
-              <a:rPr lang="en-US" b="1" dirty="0">
-                <a:solidFill>
-                  <a:schemeClr val="bg1"/>
-                </a:solidFill>
-              </a:rPr>
-              <a:t>	Implication: </a:t>
-            </a:r>
-          </a:p>
-          <a:p>
-            <a:r>
-              <a:rPr lang="en-US" b="1" dirty="0">
-                <a:solidFill>
-                  <a:schemeClr val="bg1"/>
-                </a:solidFill>
-              </a:rPr>
-              <a:t>		Anything external to a service is an attached resource, </a:t>
-            </a:r>
-          </a:p>
-          <a:p>
-            <a:r>
-              <a:rPr lang="en-US" b="1" dirty="0">
-                <a:solidFill>
-                  <a:schemeClr val="bg1"/>
-                </a:solidFill>
-              </a:rPr>
-              <a:t>			e.g. including other services. </a:t>
-            </a:r>
-          </a:p>
-          <a:p>
-            <a:r>
-              <a:rPr lang="en-US" b="1" dirty="0">
-                <a:solidFill>
-                  <a:schemeClr val="bg1"/>
-                </a:solidFill>
-              </a:rPr>
-              <a:t>Adv.</a:t>
-            </a:r>
-          </a:p>
-          <a:p>
-            <a:r>
-              <a:rPr lang="en-US" b="1" dirty="0">
-                <a:solidFill>
-                  <a:schemeClr val="bg1"/>
-                </a:solidFill>
-              </a:rPr>
-              <a:t>	every service is </a:t>
-            </a:r>
-          </a:p>
-          <a:p>
-            <a:r>
-              <a:rPr lang="en-US" b="1" dirty="0">
-                <a:solidFill>
-                  <a:schemeClr val="bg1"/>
-                </a:solidFill>
-              </a:rPr>
-              <a:t>		Completely portable </a:t>
-            </a:r>
-          </a:p>
-          <a:p>
-            <a:r>
-              <a:rPr lang="en-US" b="1" dirty="0">
-                <a:solidFill>
-                  <a:schemeClr val="bg1"/>
-                </a:solidFill>
-              </a:rPr>
-              <a:t>		Loosely coupled </a:t>
-            </a:r>
-          </a:p>
-          <a:p>
-            <a:r>
-              <a:rPr lang="en-US" b="1" dirty="0">
-                <a:solidFill>
-                  <a:schemeClr val="bg1"/>
-                </a:solidFill>
-              </a:rPr>
-              <a:t>		Strict separation increases flexibility </a:t>
-            </a:r>
-          </a:p>
-          <a:p>
-            <a:r>
-              <a:rPr lang="en-US" b="1" dirty="0">
-                <a:solidFill>
-                  <a:schemeClr val="bg1"/>
-                </a:solidFill>
-              </a:rPr>
-              <a:t>		dev. </a:t>
+              <a:t>	</a:t>
             </a:r>
             <a:r>
               <a:rPr lang="en-US" b="1" dirty="0" err="1">
@@ -8602,15 +8415,45 @@
                   <a:schemeClr val="bg1"/>
                 </a:solidFill>
               </a:rPr>
-              <a:t>engg</a:t>
-            </a:r>
-            <a:r>
-              <a:rPr lang="en-US" b="1" dirty="0">
-                <a:solidFill>
-                  <a:schemeClr val="bg1"/>
-                </a:solidFill>
-              </a:rPr>
-              <a:t>. only need to run the service(s) they are modifying, not others.</a:t>
+              <a:t>Seperate</a:t>
+            </a:r>
+            <a:r>
+              <a:rPr lang="en-US" b="1" dirty="0">
+                <a:solidFill>
+                  <a:schemeClr val="bg1"/>
+                </a:solidFill>
+              </a:rPr>
+              <a:t> build, release, and run stages for each app</a:t>
+            </a:r>
+          </a:p>
+          <a:p>
+            <a:r>
+              <a:rPr lang="en-US" b="1" dirty="0">
+                <a:solidFill>
+                  <a:schemeClr val="bg1"/>
+                </a:solidFill>
+              </a:rPr>
+              <a:t>	Additional recommendation</a:t>
+            </a:r>
+          </a:p>
+          <a:p>
+            <a:r>
+              <a:rPr lang="en-US" b="1" dirty="0">
+                <a:solidFill>
+                  <a:schemeClr val="bg1"/>
+                </a:solidFill>
+              </a:rPr>
+              <a:t>		Use CI/C (D)Delivery tool to automate builds. </a:t>
+            </a:r>
+          </a:p>
+          <a:p>
+            <a:r>
+              <a:rPr lang="en-US" b="1" dirty="0">
+                <a:solidFill>
+                  <a:schemeClr val="bg1"/>
+                </a:solidFill>
+              </a:rPr>
+              <a:t>		Docker images make it easy to separate the build and run stages. </a:t>
             </a:r>
           </a:p>
           <a:p>
@@ -8628,7 +8471,7 @@
     </p:spTree>
     <p:extLst>
       <p:ext uri="{BB962C8B-B14F-4D97-AF65-F5344CB8AC3E}">
-        <p14:creationId xmlns:p14="http://schemas.microsoft.com/office/powerpoint/2010/main" val="559799029"/>
+        <p14:creationId xmlns:p14="http://schemas.microsoft.com/office/powerpoint/2010/main" val="1502795110"/>
       </p:ext>
     </p:extLst>
   </p:cSld>

</xml_diff>

<commit_message>
Add dependency manager to eureka instructions
</commit_message>
<xml_diff>
--- a/training/day2/Day2.pptx
+++ b/training/day2/Day2.pptx
@@ -5,7 +5,7 @@
     <p:sldMasterId id="2147483648" r:id="rId1"/>
   </p:sldMasterIdLst>
   <p:notesMasterIdLst>
-    <p:notesMasterId r:id="rId31"/>
+    <p:notesMasterId r:id="rId19"/>
   </p:notesMasterIdLst>
   <p:sldIdLst>
     <p:sldId id="414" r:id="rId2"/>
@@ -25,18 +25,6 @@
     <p:sldId id="428" r:id="rId16"/>
     <p:sldId id="430" r:id="rId17"/>
     <p:sldId id="431" r:id="rId18"/>
-    <p:sldId id="432" r:id="rId19"/>
-    <p:sldId id="433" r:id="rId20"/>
-    <p:sldId id="434" r:id="rId21"/>
-    <p:sldId id="435" r:id="rId22"/>
-    <p:sldId id="436" r:id="rId23"/>
-    <p:sldId id="437" r:id="rId24"/>
-    <p:sldId id="438" r:id="rId25"/>
-    <p:sldId id="439" r:id="rId26"/>
-    <p:sldId id="440" r:id="rId27"/>
-    <p:sldId id="441" r:id="rId28"/>
-    <p:sldId id="442" r:id="rId29"/>
-    <p:sldId id="443" r:id="rId30"/>
   </p:sldIdLst>
   <p:sldSz cx="12192000" cy="6858000"/>
   <p:notesSz cx="6858000" cy="9144000"/>
@@ -225,7 +213,7 @@
           <a:p>
             <a:fld id="{F15A6252-5F50-4106-9C23-9E03A675631E}" type="datetimeFigureOut">
               <a:rPr lang="en-IN" smtClean="0"/>
-              <a:t>05-05-2020</a:t>
+              <a:t>06-05-2020</a:t>
             </a:fld>
             <a:endParaRPr lang="en-IN"/>
           </a:p>
@@ -642,7 +630,7 @@
           <a:p>
             <a:fld id="{4086692B-153F-4DFE-BFBD-A2AE2C7443B6}" type="datetimeFigureOut">
               <a:rPr lang="en-IN" smtClean="0"/>
-              <a:t>05-05-2020</a:t>
+              <a:t>06-05-2020</a:t>
             </a:fld>
             <a:endParaRPr lang="en-IN"/>
           </a:p>
@@ -842,7 +830,7 @@
           <a:p>
             <a:fld id="{4086692B-153F-4DFE-BFBD-A2AE2C7443B6}" type="datetimeFigureOut">
               <a:rPr lang="en-IN" smtClean="0"/>
-              <a:t>05-05-2020</a:t>
+              <a:t>06-05-2020</a:t>
             </a:fld>
             <a:endParaRPr lang="en-IN"/>
           </a:p>
@@ -1052,7 +1040,7 @@
           <a:p>
             <a:fld id="{4086692B-153F-4DFE-BFBD-A2AE2C7443B6}" type="datetimeFigureOut">
               <a:rPr lang="en-IN" smtClean="0"/>
-              <a:t>05-05-2020</a:t>
+              <a:t>06-05-2020</a:t>
             </a:fld>
             <a:endParaRPr lang="en-IN"/>
           </a:p>
@@ -1252,7 +1240,7 @@
           <a:p>
             <a:fld id="{4086692B-153F-4DFE-BFBD-A2AE2C7443B6}" type="datetimeFigureOut">
               <a:rPr lang="en-IN" smtClean="0"/>
-              <a:t>05-05-2020</a:t>
+              <a:t>06-05-2020</a:t>
             </a:fld>
             <a:endParaRPr lang="en-IN"/>
           </a:p>
@@ -1528,7 +1516,7 @@
           <a:p>
             <a:fld id="{4086692B-153F-4DFE-BFBD-A2AE2C7443B6}" type="datetimeFigureOut">
               <a:rPr lang="en-IN" smtClean="0"/>
-              <a:t>05-05-2020</a:t>
+              <a:t>06-05-2020</a:t>
             </a:fld>
             <a:endParaRPr lang="en-IN"/>
           </a:p>
@@ -1796,7 +1784,7 @@
           <a:p>
             <a:fld id="{4086692B-153F-4DFE-BFBD-A2AE2C7443B6}" type="datetimeFigureOut">
               <a:rPr lang="en-IN" smtClean="0"/>
-              <a:t>05-05-2020</a:t>
+              <a:t>06-05-2020</a:t>
             </a:fld>
             <a:endParaRPr lang="en-IN"/>
           </a:p>
@@ -2211,7 +2199,7 @@
           <a:p>
             <a:fld id="{4086692B-153F-4DFE-BFBD-A2AE2C7443B6}" type="datetimeFigureOut">
               <a:rPr lang="en-IN" smtClean="0"/>
-              <a:t>05-05-2020</a:t>
+              <a:t>06-05-2020</a:t>
             </a:fld>
             <a:endParaRPr lang="en-IN"/>
           </a:p>
@@ -2353,7 +2341,7 @@
           <a:p>
             <a:fld id="{4086692B-153F-4DFE-BFBD-A2AE2C7443B6}" type="datetimeFigureOut">
               <a:rPr lang="en-IN" smtClean="0"/>
-              <a:t>05-05-2020</a:t>
+              <a:t>06-05-2020</a:t>
             </a:fld>
             <a:endParaRPr lang="en-IN"/>
           </a:p>
@@ -2466,7 +2454,7 @@
           <a:p>
             <a:fld id="{4086692B-153F-4DFE-BFBD-A2AE2C7443B6}" type="datetimeFigureOut">
               <a:rPr lang="en-IN" smtClean="0"/>
-              <a:t>05-05-2020</a:t>
+              <a:t>06-05-2020</a:t>
             </a:fld>
             <a:endParaRPr lang="en-IN"/>
           </a:p>
@@ -2779,7 +2767,7 @@
           <a:p>
             <a:fld id="{4086692B-153F-4DFE-BFBD-A2AE2C7443B6}" type="datetimeFigureOut">
               <a:rPr lang="en-IN" smtClean="0"/>
-              <a:t>05-05-2020</a:t>
+              <a:t>06-05-2020</a:t>
             </a:fld>
             <a:endParaRPr lang="en-IN"/>
           </a:p>
@@ -3068,7 +3056,7 @@
           <a:p>
             <a:fld id="{4086692B-153F-4DFE-BFBD-A2AE2C7443B6}" type="datetimeFigureOut">
               <a:rPr lang="en-IN" smtClean="0"/>
-              <a:t>05-05-2020</a:t>
+              <a:t>06-05-2020</a:t>
             </a:fld>
             <a:endParaRPr lang="en-IN"/>
           </a:p>
@@ -3311,7 +3299,7 @@
           <a:p>
             <a:fld id="{4086692B-153F-4DFE-BFBD-A2AE2C7443B6}" type="datetimeFigureOut">
               <a:rPr lang="en-IN" smtClean="0"/>
-              <a:t>05-05-2020</a:t>
+              <a:t>06-05-2020</a:t>
             </a:fld>
             <a:endParaRPr lang="en-IN"/>
           </a:p>
@@ -5245,7 +5233,7 @@
                   <a:schemeClr val="bg1"/>
                 </a:solidFill>
               </a:rPr>
-              <a:t>as</a:t>
+              <a:t>Spring Boot Actuator</a:t>
             </a:r>
           </a:p>
         </p:txBody>
@@ -5265,7 +5253,7 @@
         <p:spPr>
           <a:xfrm>
             <a:off x="838200" y="1779687"/>
-            <a:ext cx="10515600" cy="369332"/>
+            <a:ext cx="10515600" cy="5078313"/>
           </a:xfrm>
           <a:prstGeom prst="rect">
             <a:avLst/>
@@ -5279,134 +5267,113 @@
           <a:lstStyle/>
           <a:p>
             <a:r>
-              <a:rPr lang="en-US" b="1" dirty="0" err="1">
-                <a:solidFill>
-                  <a:schemeClr val="bg1"/>
-                </a:solidFill>
-              </a:rPr>
-              <a:t>asd</a:t>
-            </a:r>
+              <a:rPr lang="en-US" dirty="0">
+                <a:solidFill>
+                  <a:schemeClr val="bg1"/>
+                </a:solidFill>
+              </a:rPr>
+              <a:t>Can easily monitor the </a:t>
+            </a:r>
+          </a:p>
+          <a:p>
+            <a:r>
+              <a:rPr lang="en-US" dirty="0">
+                <a:solidFill>
+                  <a:schemeClr val="bg1"/>
+                </a:solidFill>
+              </a:rPr>
+              <a:t>	Health</a:t>
+            </a:r>
+          </a:p>
+          <a:p>
+            <a:r>
+              <a:rPr lang="en-US" dirty="0">
+                <a:solidFill>
+                  <a:schemeClr val="bg1"/>
+                </a:solidFill>
+              </a:rPr>
+              <a:t>	Metrics</a:t>
+            </a:r>
+          </a:p>
+          <a:p>
+            <a:r>
+              <a:rPr lang="en-US" dirty="0">
+                <a:solidFill>
+                  <a:schemeClr val="bg1"/>
+                </a:solidFill>
+              </a:rPr>
+              <a:t>Some information are sensitive and needs to be configured to access.</a:t>
+            </a:r>
+          </a:p>
+          <a:p>
             <a:endParaRPr lang="en-US" dirty="0">
               <a:solidFill>
                 <a:schemeClr val="bg1"/>
               </a:solidFill>
             </a:endParaRPr>
           </a:p>
-        </p:txBody>
-      </p:sp>
-    </p:spTree>
-    <p:extLst>
-      <p:ext uri="{BB962C8B-B14F-4D97-AF65-F5344CB8AC3E}">
-        <p14:creationId xmlns:p14="http://schemas.microsoft.com/office/powerpoint/2010/main" val="1081268966"/>
-      </p:ext>
-    </p:extLst>
-  </p:cSld>
-  <p:clrMapOvr>
-    <a:masterClrMapping/>
-  </p:clrMapOvr>
-</p:sld>
-</file>
-
-<file path=ppt/slides/slide18.xml><?xml version="1.0" encoding="utf-8"?>
-<p:sld xmlns:a="http://schemas.openxmlformats.org/drawingml/2006/main" xmlns:r="http://schemas.openxmlformats.org/officeDocument/2006/relationships" xmlns:p="http://schemas.openxmlformats.org/presentationml/2006/main">
-  <p:cSld>
-    <p:bg>
-      <p:bgPr>
-        <a:solidFill>
-          <a:schemeClr val="tx2">
-            <a:lumMod val="60000"/>
-            <a:lumOff val="40000"/>
-          </a:schemeClr>
-        </a:solidFill>
-        <a:effectLst/>
-      </p:bgPr>
-    </p:bg>
-    <p:spTree>
-      <p:nvGrpSpPr>
-        <p:cNvPr id="1" name=""/>
-        <p:cNvGrpSpPr/>
-        <p:nvPr/>
-      </p:nvGrpSpPr>
-      <p:grpSpPr>
-        <a:xfrm>
-          <a:off x="0" y="0"/>
-          <a:ext cx="0" cy="0"/>
-          <a:chOff x="0" y="0"/>
-          <a:chExt cx="0" cy="0"/>
-        </a:xfrm>
-      </p:grpSpPr>
-      <p:sp>
-        <p:nvSpPr>
-          <p:cNvPr id="2" name="Title 1">
-            <a:extLst>
-              <a:ext uri="{FF2B5EF4-FFF2-40B4-BE49-F238E27FC236}">
-                <a16:creationId xmlns:a16="http://schemas.microsoft.com/office/drawing/2014/main" id="{51F2C05B-3556-493B-855C-1F19ADDBAF69}"/>
-              </a:ext>
-            </a:extLst>
-          </p:cNvPr>
-          <p:cNvSpPr>
-            <a:spLocks noGrp="1"/>
-          </p:cNvSpPr>
-          <p:nvPr>
-            <p:ph type="title"/>
-          </p:nvPr>
-        </p:nvSpPr>
-        <p:spPr>
-          <a:xfrm>
-            <a:off x="838200" y="365125"/>
-            <a:ext cx="11099104" cy="1325563"/>
-          </a:xfrm>
-        </p:spPr>
-        <p:txBody>
-          <a:bodyPr/>
-          <a:lstStyle/>
-          <a:p>
-            <a:r>
-              <a:rPr lang="en-US" b="1" dirty="0">
-                <a:solidFill>
-                  <a:schemeClr val="bg1"/>
-                </a:solidFill>
-              </a:rPr>
-              <a:t>as</a:t>
-            </a:r>
-          </a:p>
-        </p:txBody>
-      </p:sp>
-      <p:sp>
-        <p:nvSpPr>
-          <p:cNvPr id="4" name="TextBox 3">
-            <a:extLst>
-              <a:ext uri="{FF2B5EF4-FFF2-40B4-BE49-F238E27FC236}">
-                <a16:creationId xmlns:a16="http://schemas.microsoft.com/office/drawing/2014/main" id="{A32609F5-383A-417E-B9B0-CE955463E2E4}"/>
-              </a:ext>
-            </a:extLst>
-          </p:cNvPr>
-          <p:cNvSpPr txBox="1"/>
-          <p:nvPr/>
-        </p:nvSpPr>
-        <p:spPr>
-          <a:xfrm>
-            <a:off x="838200" y="1779687"/>
-            <a:ext cx="10515600" cy="369332"/>
-          </a:xfrm>
-          <a:prstGeom prst="rect">
-            <a:avLst/>
-          </a:prstGeom>
-          <a:noFill/>
-        </p:spPr>
-        <p:txBody>
-          <a:bodyPr wrap="square" rtlCol="0">
-            <a:spAutoFit/>
-          </a:bodyPr>
-          <a:lstStyle/>
-          <a:p>
-            <a:r>
-              <a:rPr lang="en-US" b="1" dirty="0" err="1">
-                <a:solidFill>
-                  <a:schemeClr val="bg1"/>
-                </a:solidFill>
-              </a:rPr>
-              <a:t>asd</a:t>
+          <a:p>
+            <a:r>
+              <a:rPr lang="en-US" dirty="0">
+                <a:solidFill>
+                  <a:schemeClr val="bg1"/>
+                </a:solidFill>
+              </a:rPr>
+              <a:t>Steps</a:t>
+            </a:r>
+          </a:p>
+          <a:p>
+            <a:r>
+              <a:rPr lang="en-US" dirty="0">
+                <a:solidFill>
+                  <a:schemeClr val="bg1"/>
+                </a:solidFill>
+              </a:rPr>
+              <a:t>	1. Add spring-boot-starter-actuator dependency in pom.xml</a:t>
+            </a:r>
+          </a:p>
+          <a:p>
+            <a:r>
+              <a:rPr lang="en-US" dirty="0">
+                <a:solidFill>
+                  <a:schemeClr val="bg1"/>
+                </a:solidFill>
+              </a:rPr>
+              <a:t>	2. Add "</a:t>
+            </a:r>
+            <a:r>
+              <a:rPr lang="en-US" dirty="0" err="1">
+                <a:solidFill>
+                  <a:schemeClr val="bg1"/>
+                </a:solidFill>
+              </a:rPr>
+              <a:t>management.endpoints.web.exposure.include</a:t>
+            </a:r>
+            <a:r>
+              <a:rPr lang="en-US" dirty="0">
+                <a:solidFill>
+                  <a:schemeClr val="bg1"/>
+                </a:solidFill>
+              </a:rPr>
+              <a:t>=*" in application properties. </a:t>
+            </a:r>
+          </a:p>
+          <a:p>
+            <a:r>
+              <a:rPr lang="en-US" dirty="0">
+                <a:solidFill>
+                  <a:schemeClr val="bg1"/>
+                </a:solidFill>
+              </a:rPr>
+              <a:t>	3. Access the following </a:t>
+            </a:r>
+            <a:r>
+              <a:rPr lang="en-US" dirty="0" err="1">
+                <a:solidFill>
+                  <a:schemeClr val="bg1"/>
+                </a:solidFill>
+              </a:rPr>
+              <a:t>url’s</a:t>
             </a:r>
             <a:endParaRPr lang="en-US" dirty="0">
               <a:solidFill>
@@ -5414,134 +5381,144 @@
               </a:solidFill>
             </a:endParaRPr>
           </a:p>
-        </p:txBody>
-      </p:sp>
-    </p:spTree>
-    <p:extLst>
-      <p:ext uri="{BB962C8B-B14F-4D97-AF65-F5344CB8AC3E}">
-        <p14:creationId xmlns:p14="http://schemas.microsoft.com/office/powerpoint/2010/main" val="1678020484"/>
-      </p:ext>
-    </p:extLst>
-  </p:cSld>
-  <p:clrMapOvr>
-    <a:masterClrMapping/>
-  </p:clrMapOvr>
-</p:sld>
-</file>
-
-<file path=ppt/slides/slide19.xml><?xml version="1.0" encoding="utf-8"?>
-<p:sld xmlns:a="http://schemas.openxmlformats.org/drawingml/2006/main" xmlns:r="http://schemas.openxmlformats.org/officeDocument/2006/relationships" xmlns:p="http://schemas.openxmlformats.org/presentationml/2006/main">
-  <p:cSld>
-    <p:bg>
-      <p:bgPr>
-        <a:solidFill>
-          <a:schemeClr val="tx2">
-            <a:lumMod val="60000"/>
-            <a:lumOff val="40000"/>
-          </a:schemeClr>
-        </a:solidFill>
-        <a:effectLst/>
-      </p:bgPr>
-    </p:bg>
-    <p:spTree>
-      <p:nvGrpSpPr>
-        <p:cNvPr id="1" name=""/>
-        <p:cNvGrpSpPr/>
-        <p:nvPr/>
-      </p:nvGrpSpPr>
-      <p:grpSpPr>
-        <a:xfrm>
-          <a:off x="0" y="0"/>
-          <a:ext cx="0" cy="0"/>
-          <a:chOff x="0" y="0"/>
-          <a:chExt cx="0" cy="0"/>
-        </a:xfrm>
-      </p:grpSpPr>
-      <p:sp>
-        <p:nvSpPr>
-          <p:cNvPr id="2" name="Title 1">
-            <a:extLst>
-              <a:ext uri="{FF2B5EF4-FFF2-40B4-BE49-F238E27FC236}">
-                <a16:creationId xmlns:a16="http://schemas.microsoft.com/office/drawing/2014/main" id="{51F2C05B-3556-493B-855C-1F19ADDBAF69}"/>
-              </a:ext>
-            </a:extLst>
-          </p:cNvPr>
-          <p:cNvSpPr>
-            <a:spLocks noGrp="1"/>
-          </p:cNvSpPr>
-          <p:nvPr>
-            <p:ph type="title"/>
-          </p:nvPr>
-        </p:nvSpPr>
-        <p:spPr>
-          <a:xfrm>
-            <a:off x="838200" y="365125"/>
-            <a:ext cx="11099104" cy="1325563"/>
-          </a:xfrm>
-        </p:spPr>
-        <p:txBody>
-          <a:bodyPr/>
-          <a:lstStyle/>
-          <a:p>
-            <a:r>
-              <a:rPr lang="en-US" b="1" dirty="0">
-                <a:solidFill>
-                  <a:schemeClr val="bg1"/>
-                </a:solidFill>
-              </a:rPr>
-              <a:t>as</a:t>
-            </a:r>
-          </a:p>
-        </p:txBody>
-      </p:sp>
-      <p:sp>
-        <p:nvSpPr>
-          <p:cNvPr id="4" name="TextBox 3">
-            <a:extLst>
-              <a:ext uri="{FF2B5EF4-FFF2-40B4-BE49-F238E27FC236}">
-                <a16:creationId xmlns:a16="http://schemas.microsoft.com/office/drawing/2014/main" id="{A32609F5-383A-417E-B9B0-CE955463E2E4}"/>
-              </a:ext>
-            </a:extLst>
-          </p:cNvPr>
-          <p:cNvSpPr txBox="1"/>
-          <p:nvPr/>
-        </p:nvSpPr>
-        <p:spPr>
-          <a:xfrm>
-            <a:off x="838200" y="1779687"/>
-            <a:ext cx="10515600" cy="369332"/>
-          </a:xfrm>
-          <a:prstGeom prst="rect">
-            <a:avLst/>
-          </a:prstGeom>
-          <a:noFill/>
-        </p:spPr>
-        <p:txBody>
-          <a:bodyPr wrap="square" rtlCol="0">
-            <a:spAutoFit/>
-          </a:bodyPr>
-          <a:lstStyle/>
-          <a:p>
-            <a:r>
-              <a:rPr lang="en-US" b="1" dirty="0" err="1">
-                <a:solidFill>
-                  <a:schemeClr val="bg1"/>
-                </a:solidFill>
-              </a:rPr>
-              <a:t>asd</a:t>
-            </a:r>
+          <a:p>
+            <a:r>
+              <a:rPr lang="en-US" dirty="0">
+                <a:solidFill>
+                  <a:schemeClr val="bg1"/>
+                </a:solidFill>
+              </a:rPr>
+              <a:t>		localhost:8080/health	#Health of the application	- e.g. Up/down</a:t>
+            </a:r>
+          </a:p>
+          <a:p>
+            <a:r>
+              <a:rPr lang="en-US" dirty="0">
+                <a:solidFill>
+                  <a:schemeClr val="bg1"/>
+                </a:solidFill>
+              </a:rPr>
+              <a:t>		localhost:8080/metrics	#Metrics of the application 	– e.g. Memory, CPU </a:t>
+            </a:r>
+            <a:r>
+              <a:rPr lang="en-US" dirty="0" err="1">
+                <a:solidFill>
+                  <a:schemeClr val="bg1"/>
+                </a:solidFill>
+              </a:rPr>
+              <a:t>ect</a:t>
+            </a:r>
+            <a:r>
+              <a:rPr lang="en-US" dirty="0">
+                <a:solidFill>
+                  <a:schemeClr val="bg1"/>
+                </a:solidFill>
+              </a:rPr>
+              <a:t>.</a:t>
+            </a:r>
+          </a:p>
+          <a:p>
+            <a:r>
+              <a:rPr lang="en-US" dirty="0">
+                <a:solidFill>
+                  <a:schemeClr val="bg1"/>
+                </a:solidFill>
+              </a:rPr>
+              <a:t>		localhost:8080/env		#Environment detail.</a:t>
+            </a:r>
+          </a:p>
+          <a:p>
+            <a:r>
+              <a:rPr lang="en-US" dirty="0">
+                <a:solidFill>
+                  <a:schemeClr val="bg1"/>
+                </a:solidFill>
+              </a:rPr>
+              <a:t>Sensitive check can be disabled as</a:t>
+            </a:r>
+          </a:p>
+          <a:p>
+            <a:r>
+              <a:rPr lang="en-US" dirty="0">
+                <a:solidFill>
+                  <a:schemeClr val="bg1"/>
+                </a:solidFill>
+              </a:rPr>
+              <a:t>	Add </a:t>
+            </a:r>
+            <a:r>
+              <a:rPr lang="en-US" dirty="0" err="1">
+                <a:solidFill>
+                  <a:schemeClr val="bg1"/>
+                </a:solidFill>
+              </a:rPr>
+              <a:t>endpoints.health.sensitive</a:t>
+            </a:r>
+            <a:r>
+              <a:rPr lang="en-US" dirty="0">
+                <a:solidFill>
+                  <a:schemeClr val="bg1"/>
+                </a:solidFill>
+              </a:rPr>
+              <a:t>=false</a:t>
+            </a:r>
+          </a:p>
+          <a:p>
+            <a:r>
+              <a:rPr lang="en-US" dirty="0">
+                <a:solidFill>
+                  <a:schemeClr val="bg1"/>
+                </a:solidFill>
+              </a:rPr>
+              <a:t>More information/documentation of all endpoints</a:t>
+            </a:r>
+          </a:p>
+          <a:p>
+            <a:r>
+              <a:rPr lang="en-US" dirty="0">
+                <a:solidFill>
+                  <a:schemeClr val="bg1"/>
+                </a:solidFill>
+              </a:rPr>
+              <a:t>	spring.</a:t>
+            </a:r>
+            <a:r>
+              <a:rPr lang="en-US">
+                <a:solidFill>
+                  <a:schemeClr val="bg1"/>
+                </a:solidFill>
+              </a:rPr>
+              <a:t>io site.</a:t>
+            </a:r>
+            <a:r>
+              <a:rPr lang="en-US" dirty="0">
+                <a:solidFill>
+                  <a:schemeClr val="bg1"/>
+                </a:solidFill>
+              </a:rPr>
+              <a:t>		</a:t>
+            </a:r>
+          </a:p>
+          <a:p>
             <a:endParaRPr lang="en-US" dirty="0">
               <a:solidFill>
                 <a:schemeClr val="bg1"/>
               </a:solidFill>
             </a:endParaRPr>
           </a:p>
+          <a:p>
+            <a:endParaRPr lang="en-US" dirty="0">
+              <a:solidFill>
+                <a:schemeClr val="bg1"/>
+              </a:solidFill>
+            </a:endParaRPr>
+          </a:p>
         </p:txBody>
       </p:sp>
     </p:spTree>
     <p:extLst>
       <p:ext uri="{BB962C8B-B14F-4D97-AF65-F5344CB8AC3E}">
-        <p14:creationId xmlns:p14="http://schemas.microsoft.com/office/powerpoint/2010/main" val="3639391312"/>
+        <p14:creationId xmlns:p14="http://schemas.microsoft.com/office/powerpoint/2010/main" val="1224707772"/>
       </p:ext>
     </p:extLst>
   </p:cSld>
@@ -5631,7 +5608,7 @@
         <p:spPr>
           <a:xfrm>
             <a:off x="838200" y="1779687"/>
-            <a:ext cx="10515600" cy="4247317"/>
+            <a:ext cx="10515600" cy="4801314"/>
           </a:xfrm>
           <a:prstGeom prst="rect">
             <a:avLst/>
@@ -5745,17 +5722,83 @@
                   <a:schemeClr val="bg1"/>
                 </a:solidFill>
               </a:rPr>
-              <a:t>	Get, Post, Put, Delete</a:t>
-            </a:r>
-          </a:p>
-          <a:p>
-            <a:r>
-              <a:rPr lang="en-US" b="1" dirty="0">
-                <a:solidFill>
-                  <a:schemeClr val="bg1"/>
-                </a:solidFill>
-              </a:rPr>
-              <a:t>	Called Swamp of POX (Plain old xml)</a:t>
+              <a:t>		</a:t>
+            </a:r>
+            <a:r>
+              <a:rPr lang="en-US" b="1" dirty="0">
+                <a:solidFill>
+                  <a:schemeClr val="bg1"/>
+                </a:solidFill>
+                <a:hlinkClick r:id="rId2"/>
+              </a:rPr>
+              <a:t>http://abc.com/createEmployee?empName=abc&amp;dept=xyz</a:t>
+            </a:r>
+            <a:endParaRPr lang="en-US" b="1" dirty="0">
+              <a:solidFill>
+                <a:schemeClr val="bg1"/>
+              </a:solidFill>
+            </a:endParaRPr>
+          </a:p>
+          <a:p>
+            <a:r>
+              <a:rPr lang="en-US" b="1" dirty="0">
+                <a:solidFill>
+                  <a:schemeClr val="bg1"/>
+                </a:solidFill>
+              </a:rPr>
+              <a:t>		Or </a:t>
+            </a:r>
+            <a:r>
+              <a:rPr lang="en-US" b="1" dirty="0" err="1">
+                <a:solidFill>
+                  <a:schemeClr val="bg1"/>
+                </a:solidFill>
+              </a:rPr>
+              <a:t>empName</a:t>
+            </a:r>
+            <a:r>
+              <a:rPr lang="en-US" b="1" dirty="0">
+                <a:solidFill>
+                  <a:schemeClr val="bg1"/>
+                </a:solidFill>
+              </a:rPr>
+              <a:t> and dept could be in the </a:t>
+            </a:r>
+            <a:r>
+              <a:rPr lang="en-US" b="1" dirty="0" err="1">
+                <a:solidFill>
+                  <a:schemeClr val="bg1"/>
+                </a:solidFill>
+              </a:rPr>
+              <a:t>RequestBody</a:t>
+            </a:r>
+            <a:r>
+              <a:rPr lang="en-US" b="1" dirty="0">
+                <a:solidFill>
+                  <a:schemeClr val="bg1"/>
+                </a:solidFill>
+              </a:rPr>
+              <a:t> – not URL.</a:t>
+            </a:r>
+          </a:p>
+          <a:p>
+            <a:r>
+              <a:rPr lang="en-US" b="1" dirty="0">
+                <a:solidFill>
+                  <a:schemeClr val="bg1"/>
+                </a:solidFill>
+              </a:rPr>
+              <a:t>		Called Swamp of POX (Plain old xml)</a:t>
+            </a:r>
+          </a:p>
+          <a:p>
+            <a:r>
+              <a:rPr lang="en-US" b="1" dirty="0">
+                <a:solidFill>
+                  <a:schemeClr val="bg1"/>
+                </a:solidFill>
+              </a:rPr>
+              <a:t>		No HTTP constructs used.</a:t>
             </a:r>
           </a:p>
           <a:p>
@@ -5794,1226 +5837,6 @@
     <p:extLst>
       <p:ext uri="{BB962C8B-B14F-4D97-AF65-F5344CB8AC3E}">
         <p14:creationId xmlns:p14="http://schemas.microsoft.com/office/powerpoint/2010/main" val="216972676"/>
-      </p:ext>
-    </p:extLst>
-  </p:cSld>
-  <p:clrMapOvr>
-    <a:masterClrMapping/>
-  </p:clrMapOvr>
-</p:sld>
-</file>
-
-<file path=ppt/slides/slide20.xml><?xml version="1.0" encoding="utf-8"?>
-<p:sld xmlns:a="http://schemas.openxmlformats.org/drawingml/2006/main" xmlns:r="http://schemas.openxmlformats.org/officeDocument/2006/relationships" xmlns:p="http://schemas.openxmlformats.org/presentationml/2006/main">
-  <p:cSld>
-    <p:bg>
-      <p:bgPr>
-        <a:solidFill>
-          <a:schemeClr val="tx2">
-            <a:lumMod val="60000"/>
-            <a:lumOff val="40000"/>
-          </a:schemeClr>
-        </a:solidFill>
-        <a:effectLst/>
-      </p:bgPr>
-    </p:bg>
-    <p:spTree>
-      <p:nvGrpSpPr>
-        <p:cNvPr id="1" name=""/>
-        <p:cNvGrpSpPr/>
-        <p:nvPr/>
-      </p:nvGrpSpPr>
-      <p:grpSpPr>
-        <a:xfrm>
-          <a:off x="0" y="0"/>
-          <a:ext cx="0" cy="0"/>
-          <a:chOff x="0" y="0"/>
-          <a:chExt cx="0" cy="0"/>
-        </a:xfrm>
-      </p:grpSpPr>
-      <p:sp>
-        <p:nvSpPr>
-          <p:cNvPr id="2" name="Title 1">
-            <a:extLst>
-              <a:ext uri="{FF2B5EF4-FFF2-40B4-BE49-F238E27FC236}">
-                <a16:creationId xmlns:a16="http://schemas.microsoft.com/office/drawing/2014/main" id="{51F2C05B-3556-493B-855C-1F19ADDBAF69}"/>
-              </a:ext>
-            </a:extLst>
-          </p:cNvPr>
-          <p:cNvSpPr>
-            <a:spLocks noGrp="1"/>
-          </p:cNvSpPr>
-          <p:nvPr>
-            <p:ph type="title"/>
-          </p:nvPr>
-        </p:nvSpPr>
-        <p:spPr>
-          <a:xfrm>
-            <a:off x="838200" y="365125"/>
-            <a:ext cx="11099104" cy="1325563"/>
-          </a:xfrm>
-        </p:spPr>
-        <p:txBody>
-          <a:bodyPr/>
-          <a:lstStyle/>
-          <a:p>
-            <a:r>
-              <a:rPr lang="en-US" b="1" dirty="0">
-                <a:solidFill>
-                  <a:schemeClr val="bg1"/>
-                </a:solidFill>
-              </a:rPr>
-              <a:t>as</a:t>
-            </a:r>
-          </a:p>
-        </p:txBody>
-      </p:sp>
-      <p:sp>
-        <p:nvSpPr>
-          <p:cNvPr id="4" name="TextBox 3">
-            <a:extLst>
-              <a:ext uri="{FF2B5EF4-FFF2-40B4-BE49-F238E27FC236}">
-                <a16:creationId xmlns:a16="http://schemas.microsoft.com/office/drawing/2014/main" id="{A32609F5-383A-417E-B9B0-CE955463E2E4}"/>
-              </a:ext>
-            </a:extLst>
-          </p:cNvPr>
-          <p:cNvSpPr txBox="1"/>
-          <p:nvPr/>
-        </p:nvSpPr>
-        <p:spPr>
-          <a:xfrm>
-            <a:off x="838200" y="1779687"/>
-            <a:ext cx="10515600" cy="369332"/>
-          </a:xfrm>
-          <a:prstGeom prst="rect">
-            <a:avLst/>
-          </a:prstGeom>
-          <a:noFill/>
-        </p:spPr>
-        <p:txBody>
-          <a:bodyPr wrap="square" rtlCol="0">
-            <a:spAutoFit/>
-          </a:bodyPr>
-          <a:lstStyle/>
-          <a:p>
-            <a:r>
-              <a:rPr lang="en-US" b="1" dirty="0" err="1">
-                <a:solidFill>
-                  <a:schemeClr val="bg1"/>
-                </a:solidFill>
-              </a:rPr>
-              <a:t>asd</a:t>
-            </a:r>
-            <a:endParaRPr lang="en-US" dirty="0">
-              <a:solidFill>
-                <a:schemeClr val="bg1"/>
-              </a:solidFill>
-            </a:endParaRPr>
-          </a:p>
-        </p:txBody>
-      </p:sp>
-    </p:spTree>
-    <p:extLst>
-      <p:ext uri="{BB962C8B-B14F-4D97-AF65-F5344CB8AC3E}">
-        <p14:creationId xmlns:p14="http://schemas.microsoft.com/office/powerpoint/2010/main" val="3846244411"/>
-      </p:ext>
-    </p:extLst>
-  </p:cSld>
-  <p:clrMapOvr>
-    <a:masterClrMapping/>
-  </p:clrMapOvr>
-</p:sld>
-</file>
-
-<file path=ppt/slides/slide21.xml><?xml version="1.0" encoding="utf-8"?>
-<p:sld xmlns:a="http://schemas.openxmlformats.org/drawingml/2006/main" xmlns:r="http://schemas.openxmlformats.org/officeDocument/2006/relationships" xmlns:p="http://schemas.openxmlformats.org/presentationml/2006/main">
-  <p:cSld>
-    <p:bg>
-      <p:bgPr>
-        <a:solidFill>
-          <a:schemeClr val="tx2">
-            <a:lumMod val="60000"/>
-            <a:lumOff val="40000"/>
-          </a:schemeClr>
-        </a:solidFill>
-        <a:effectLst/>
-      </p:bgPr>
-    </p:bg>
-    <p:spTree>
-      <p:nvGrpSpPr>
-        <p:cNvPr id="1" name=""/>
-        <p:cNvGrpSpPr/>
-        <p:nvPr/>
-      </p:nvGrpSpPr>
-      <p:grpSpPr>
-        <a:xfrm>
-          <a:off x="0" y="0"/>
-          <a:ext cx="0" cy="0"/>
-          <a:chOff x="0" y="0"/>
-          <a:chExt cx="0" cy="0"/>
-        </a:xfrm>
-      </p:grpSpPr>
-      <p:sp>
-        <p:nvSpPr>
-          <p:cNvPr id="2" name="Title 1">
-            <a:extLst>
-              <a:ext uri="{FF2B5EF4-FFF2-40B4-BE49-F238E27FC236}">
-                <a16:creationId xmlns:a16="http://schemas.microsoft.com/office/drawing/2014/main" id="{51F2C05B-3556-493B-855C-1F19ADDBAF69}"/>
-              </a:ext>
-            </a:extLst>
-          </p:cNvPr>
-          <p:cNvSpPr>
-            <a:spLocks noGrp="1"/>
-          </p:cNvSpPr>
-          <p:nvPr>
-            <p:ph type="title"/>
-          </p:nvPr>
-        </p:nvSpPr>
-        <p:spPr>
-          <a:xfrm>
-            <a:off x="838200" y="365125"/>
-            <a:ext cx="11099104" cy="1325563"/>
-          </a:xfrm>
-        </p:spPr>
-        <p:txBody>
-          <a:bodyPr/>
-          <a:lstStyle/>
-          <a:p>
-            <a:r>
-              <a:rPr lang="en-US" b="1" dirty="0">
-                <a:solidFill>
-                  <a:schemeClr val="bg1"/>
-                </a:solidFill>
-              </a:rPr>
-              <a:t>as</a:t>
-            </a:r>
-          </a:p>
-        </p:txBody>
-      </p:sp>
-      <p:sp>
-        <p:nvSpPr>
-          <p:cNvPr id="4" name="TextBox 3">
-            <a:extLst>
-              <a:ext uri="{FF2B5EF4-FFF2-40B4-BE49-F238E27FC236}">
-                <a16:creationId xmlns:a16="http://schemas.microsoft.com/office/drawing/2014/main" id="{A32609F5-383A-417E-B9B0-CE955463E2E4}"/>
-              </a:ext>
-            </a:extLst>
-          </p:cNvPr>
-          <p:cNvSpPr txBox="1"/>
-          <p:nvPr/>
-        </p:nvSpPr>
-        <p:spPr>
-          <a:xfrm>
-            <a:off x="838200" y="1779687"/>
-            <a:ext cx="10515600" cy="369332"/>
-          </a:xfrm>
-          <a:prstGeom prst="rect">
-            <a:avLst/>
-          </a:prstGeom>
-          <a:noFill/>
-        </p:spPr>
-        <p:txBody>
-          <a:bodyPr wrap="square" rtlCol="0">
-            <a:spAutoFit/>
-          </a:bodyPr>
-          <a:lstStyle/>
-          <a:p>
-            <a:r>
-              <a:rPr lang="en-US" b="1" dirty="0" err="1">
-                <a:solidFill>
-                  <a:schemeClr val="bg1"/>
-                </a:solidFill>
-              </a:rPr>
-              <a:t>asd</a:t>
-            </a:r>
-            <a:endParaRPr lang="en-US" dirty="0">
-              <a:solidFill>
-                <a:schemeClr val="bg1"/>
-              </a:solidFill>
-            </a:endParaRPr>
-          </a:p>
-        </p:txBody>
-      </p:sp>
-    </p:spTree>
-    <p:extLst>
-      <p:ext uri="{BB962C8B-B14F-4D97-AF65-F5344CB8AC3E}">
-        <p14:creationId xmlns:p14="http://schemas.microsoft.com/office/powerpoint/2010/main" val="3954957470"/>
-      </p:ext>
-    </p:extLst>
-  </p:cSld>
-  <p:clrMapOvr>
-    <a:masterClrMapping/>
-  </p:clrMapOvr>
-</p:sld>
-</file>
-
-<file path=ppt/slides/slide22.xml><?xml version="1.0" encoding="utf-8"?>
-<p:sld xmlns:a="http://schemas.openxmlformats.org/drawingml/2006/main" xmlns:r="http://schemas.openxmlformats.org/officeDocument/2006/relationships" xmlns:p="http://schemas.openxmlformats.org/presentationml/2006/main">
-  <p:cSld>
-    <p:bg>
-      <p:bgPr>
-        <a:solidFill>
-          <a:schemeClr val="tx2">
-            <a:lumMod val="60000"/>
-            <a:lumOff val="40000"/>
-          </a:schemeClr>
-        </a:solidFill>
-        <a:effectLst/>
-      </p:bgPr>
-    </p:bg>
-    <p:spTree>
-      <p:nvGrpSpPr>
-        <p:cNvPr id="1" name=""/>
-        <p:cNvGrpSpPr/>
-        <p:nvPr/>
-      </p:nvGrpSpPr>
-      <p:grpSpPr>
-        <a:xfrm>
-          <a:off x="0" y="0"/>
-          <a:ext cx="0" cy="0"/>
-          <a:chOff x="0" y="0"/>
-          <a:chExt cx="0" cy="0"/>
-        </a:xfrm>
-      </p:grpSpPr>
-      <p:sp>
-        <p:nvSpPr>
-          <p:cNvPr id="2" name="Title 1">
-            <a:extLst>
-              <a:ext uri="{FF2B5EF4-FFF2-40B4-BE49-F238E27FC236}">
-                <a16:creationId xmlns:a16="http://schemas.microsoft.com/office/drawing/2014/main" id="{51F2C05B-3556-493B-855C-1F19ADDBAF69}"/>
-              </a:ext>
-            </a:extLst>
-          </p:cNvPr>
-          <p:cNvSpPr>
-            <a:spLocks noGrp="1"/>
-          </p:cNvSpPr>
-          <p:nvPr>
-            <p:ph type="title"/>
-          </p:nvPr>
-        </p:nvSpPr>
-        <p:spPr>
-          <a:xfrm>
-            <a:off x="838200" y="365125"/>
-            <a:ext cx="11099104" cy="1325563"/>
-          </a:xfrm>
-        </p:spPr>
-        <p:txBody>
-          <a:bodyPr/>
-          <a:lstStyle/>
-          <a:p>
-            <a:r>
-              <a:rPr lang="en-US" b="1" dirty="0">
-                <a:solidFill>
-                  <a:schemeClr val="bg1"/>
-                </a:solidFill>
-              </a:rPr>
-              <a:t>as</a:t>
-            </a:r>
-          </a:p>
-        </p:txBody>
-      </p:sp>
-      <p:sp>
-        <p:nvSpPr>
-          <p:cNvPr id="4" name="TextBox 3">
-            <a:extLst>
-              <a:ext uri="{FF2B5EF4-FFF2-40B4-BE49-F238E27FC236}">
-                <a16:creationId xmlns:a16="http://schemas.microsoft.com/office/drawing/2014/main" id="{A32609F5-383A-417E-B9B0-CE955463E2E4}"/>
-              </a:ext>
-            </a:extLst>
-          </p:cNvPr>
-          <p:cNvSpPr txBox="1"/>
-          <p:nvPr/>
-        </p:nvSpPr>
-        <p:spPr>
-          <a:xfrm>
-            <a:off x="838200" y="1779687"/>
-            <a:ext cx="10515600" cy="369332"/>
-          </a:xfrm>
-          <a:prstGeom prst="rect">
-            <a:avLst/>
-          </a:prstGeom>
-          <a:noFill/>
-        </p:spPr>
-        <p:txBody>
-          <a:bodyPr wrap="square" rtlCol="0">
-            <a:spAutoFit/>
-          </a:bodyPr>
-          <a:lstStyle/>
-          <a:p>
-            <a:r>
-              <a:rPr lang="en-US" b="1" dirty="0" err="1">
-                <a:solidFill>
-                  <a:schemeClr val="bg1"/>
-                </a:solidFill>
-              </a:rPr>
-              <a:t>asd</a:t>
-            </a:r>
-            <a:endParaRPr lang="en-US" dirty="0">
-              <a:solidFill>
-                <a:schemeClr val="bg1"/>
-              </a:solidFill>
-            </a:endParaRPr>
-          </a:p>
-        </p:txBody>
-      </p:sp>
-    </p:spTree>
-    <p:extLst>
-      <p:ext uri="{BB962C8B-B14F-4D97-AF65-F5344CB8AC3E}">
-        <p14:creationId xmlns:p14="http://schemas.microsoft.com/office/powerpoint/2010/main" val="1798581727"/>
-      </p:ext>
-    </p:extLst>
-  </p:cSld>
-  <p:clrMapOvr>
-    <a:masterClrMapping/>
-  </p:clrMapOvr>
-</p:sld>
-</file>
-
-<file path=ppt/slides/slide23.xml><?xml version="1.0" encoding="utf-8"?>
-<p:sld xmlns:a="http://schemas.openxmlformats.org/drawingml/2006/main" xmlns:r="http://schemas.openxmlformats.org/officeDocument/2006/relationships" xmlns:p="http://schemas.openxmlformats.org/presentationml/2006/main">
-  <p:cSld>
-    <p:bg>
-      <p:bgPr>
-        <a:solidFill>
-          <a:schemeClr val="tx2">
-            <a:lumMod val="60000"/>
-            <a:lumOff val="40000"/>
-          </a:schemeClr>
-        </a:solidFill>
-        <a:effectLst/>
-      </p:bgPr>
-    </p:bg>
-    <p:spTree>
-      <p:nvGrpSpPr>
-        <p:cNvPr id="1" name=""/>
-        <p:cNvGrpSpPr/>
-        <p:nvPr/>
-      </p:nvGrpSpPr>
-      <p:grpSpPr>
-        <a:xfrm>
-          <a:off x="0" y="0"/>
-          <a:ext cx="0" cy="0"/>
-          <a:chOff x="0" y="0"/>
-          <a:chExt cx="0" cy="0"/>
-        </a:xfrm>
-      </p:grpSpPr>
-      <p:sp>
-        <p:nvSpPr>
-          <p:cNvPr id="2" name="Title 1">
-            <a:extLst>
-              <a:ext uri="{FF2B5EF4-FFF2-40B4-BE49-F238E27FC236}">
-                <a16:creationId xmlns:a16="http://schemas.microsoft.com/office/drawing/2014/main" id="{51F2C05B-3556-493B-855C-1F19ADDBAF69}"/>
-              </a:ext>
-            </a:extLst>
-          </p:cNvPr>
-          <p:cNvSpPr>
-            <a:spLocks noGrp="1"/>
-          </p:cNvSpPr>
-          <p:nvPr>
-            <p:ph type="title"/>
-          </p:nvPr>
-        </p:nvSpPr>
-        <p:spPr>
-          <a:xfrm>
-            <a:off x="838200" y="365125"/>
-            <a:ext cx="11099104" cy="1325563"/>
-          </a:xfrm>
-        </p:spPr>
-        <p:txBody>
-          <a:bodyPr/>
-          <a:lstStyle/>
-          <a:p>
-            <a:r>
-              <a:rPr lang="en-US" b="1" dirty="0">
-                <a:solidFill>
-                  <a:schemeClr val="bg1"/>
-                </a:solidFill>
-              </a:rPr>
-              <a:t>as</a:t>
-            </a:r>
-          </a:p>
-        </p:txBody>
-      </p:sp>
-      <p:sp>
-        <p:nvSpPr>
-          <p:cNvPr id="4" name="TextBox 3">
-            <a:extLst>
-              <a:ext uri="{FF2B5EF4-FFF2-40B4-BE49-F238E27FC236}">
-                <a16:creationId xmlns:a16="http://schemas.microsoft.com/office/drawing/2014/main" id="{A32609F5-383A-417E-B9B0-CE955463E2E4}"/>
-              </a:ext>
-            </a:extLst>
-          </p:cNvPr>
-          <p:cNvSpPr txBox="1"/>
-          <p:nvPr/>
-        </p:nvSpPr>
-        <p:spPr>
-          <a:xfrm>
-            <a:off x="838200" y="1779687"/>
-            <a:ext cx="10515600" cy="369332"/>
-          </a:xfrm>
-          <a:prstGeom prst="rect">
-            <a:avLst/>
-          </a:prstGeom>
-          <a:noFill/>
-        </p:spPr>
-        <p:txBody>
-          <a:bodyPr wrap="square" rtlCol="0">
-            <a:spAutoFit/>
-          </a:bodyPr>
-          <a:lstStyle/>
-          <a:p>
-            <a:r>
-              <a:rPr lang="en-US" b="1" dirty="0" err="1">
-                <a:solidFill>
-                  <a:schemeClr val="bg1"/>
-                </a:solidFill>
-              </a:rPr>
-              <a:t>asd</a:t>
-            </a:r>
-            <a:endParaRPr lang="en-US" dirty="0">
-              <a:solidFill>
-                <a:schemeClr val="bg1"/>
-              </a:solidFill>
-            </a:endParaRPr>
-          </a:p>
-        </p:txBody>
-      </p:sp>
-    </p:spTree>
-    <p:extLst>
-      <p:ext uri="{BB962C8B-B14F-4D97-AF65-F5344CB8AC3E}">
-        <p14:creationId xmlns:p14="http://schemas.microsoft.com/office/powerpoint/2010/main" val="20253337"/>
-      </p:ext>
-    </p:extLst>
-  </p:cSld>
-  <p:clrMapOvr>
-    <a:masterClrMapping/>
-  </p:clrMapOvr>
-</p:sld>
-</file>
-
-<file path=ppt/slides/slide24.xml><?xml version="1.0" encoding="utf-8"?>
-<p:sld xmlns:a="http://schemas.openxmlformats.org/drawingml/2006/main" xmlns:r="http://schemas.openxmlformats.org/officeDocument/2006/relationships" xmlns:p="http://schemas.openxmlformats.org/presentationml/2006/main">
-  <p:cSld>
-    <p:bg>
-      <p:bgPr>
-        <a:solidFill>
-          <a:schemeClr val="tx2">
-            <a:lumMod val="60000"/>
-            <a:lumOff val="40000"/>
-          </a:schemeClr>
-        </a:solidFill>
-        <a:effectLst/>
-      </p:bgPr>
-    </p:bg>
-    <p:spTree>
-      <p:nvGrpSpPr>
-        <p:cNvPr id="1" name=""/>
-        <p:cNvGrpSpPr/>
-        <p:nvPr/>
-      </p:nvGrpSpPr>
-      <p:grpSpPr>
-        <a:xfrm>
-          <a:off x="0" y="0"/>
-          <a:ext cx="0" cy="0"/>
-          <a:chOff x="0" y="0"/>
-          <a:chExt cx="0" cy="0"/>
-        </a:xfrm>
-      </p:grpSpPr>
-      <p:sp>
-        <p:nvSpPr>
-          <p:cNvPr id="2" name="Title 1">
-            <a:extLst>
-              <a:ext uri="{FF2B5EF4-FFF2-40B4-BE49-F238E27FC236}">
-                <a16:creationId xmlns:a16="http://schemas.microsoft.com/office/drawing/2014/main" id="{51F2C05B-3556-493B-855C-1F19ADDBAF69}"/>
-              </a:ext>
-            </a:extLst>
-          </p:cNvPr>
-          <p:cNvSpPr>
-            <a:spLocks noGrp="1"/>
-          </p:cNvSpPr>
-          <p:nvPr>
-            <p:ph type="title"/>
-          </p:nvPr>
-        </p:nvSpPr>
-        <p:spPr>
-          <a:xfrm>
-            <a:off x="838200" y="365125"/>
-            <a:ext cx="11099104" cy="1325563"/>
-          </a:xfrm>
-        </p:spPr>
-        <p:txBody>
-          <a:bodyPr/>
-          <a:lstStyle/>
-          <a:p>
-            <a:r>
-              <a:rPr lang="en-US" b="1" dirty="0">
-                <a:solidFill>
-                  <a:schemeClr val="bg1"/>
-                </a:solidFill>
-              </a:rPr>
-              <a:t>as</a:t>
-            </a:r>
-          </a:p>
-        </p:txBody>
-      </p:sp>
-      <p:sp>
-        <p:nvSpPr>
-          <p:cNvPr id="4" name="TextBox 3">
-            <a:extLst>
-              <a:ext uri="{FF2B5EF4-FFF2-40B4-BE49-F238E27FC236}">
-                <a16:creationId xmlns:a16="http://schemas.microsoft.com/office/drawing/2014/main" id="{A32609F5-383A-417E-B9B0-CE955463E2E4}"/>
-              </a:ext>
-            </a:extLst>
-          </p:cNvPr>
-          <p:cNvSpPr txBox="1"/>
-          <p:nvPr/>
-        </p:nvSpPr>
-        <p:spPr>
-          <a:xfrm>
-            <a:off x="838200" y="1779687"/>
-            <a:ext cx="10515600" cy="369332"/>
-          </a:xfrm>
-          <a:prstGeom prst="rect">
-            <a:avLst/>
-          </a:prstGeom>
-          <a:noFill/>
-        </p:spPr>
-        <p:txBody>
-          <a:bodyPr wrap="square" rtlCol="0">
-            <a:spAutoFit/>
-          </a:bodyPr>
-          <a:lstStyle/>
-          <a:p>
-            <a:r>
-              <a:rPr lang="en-US" b="1" dirty="0" err="1">
-                <a:solidFill>
-                  <a:schemeClr val="bg1"/>
-                </a:solidFill>
-              </a:rPr>
-              <a:t>asd</a:t>
-            </a:r>
-            <a:endParaRPr lang="en-US" dirty="0">
-              <a:solidFill>
-                <a:schemeClr val="bg1"/>
-              </a:solidFill>
-            </a:endParaRPr>
-          </a:p>
-        </p:txBody>
-      </p:sp>
-    </p:spTree>
-    <p:extLst>
-      <p:ext uri="{BB962C8B-B14F-4D97-AF65-F5344CB8AC3E}">
-        <p14:creationId xmlns:p14="http://schemas.microsoft.com/office/powerpoint/2010/main" val="4139057196"/>
-      </p:ext>
-    </p:extLst>
-  </p:cSld>
-  <p:clrMapOvr>
-    <a:masterClrMapping/>
-  </p:clrMapOvr>
-</p:sld>
-</file>
-
-<file path=ppt/slides/slide25.xml><?xml version="1.0" encoding="utf-8"?>
-<p:sld xmlns:a="http://schemas.openxmlformats.org/drawingml/2006/main" xmlns:r="http://schemas.openxmlformats.org/officeDocument/2006/relationships" xmlns:p="http://schemas.openxmlformats.org/presentationml/2006/main">
-  <p:cSld>
-    <p:bg>
-      <p:bgPr>
-        <a:solidFill>
-          <a:schemeClr val="tx2">
-            <a:lumMod val="60000"/>
-            <a:lumOff val="40000"/>
-          </a:schemeClr>
-        </a:solidFill>
-        <a:effectLst/>
-      </p:bgPr>
-    </p:bg>
-    <p:spTree>
-      <p:nvGrpSpPr>
-        <p:cNvPr id="1" name=""/>
-        <p:cNvGrpSpPr/>
-        <p:nvPr/>
-      </p:nvGrpSpPr>
-      <p:grpSpPr>
-        <a:xfrm>
-          <a:off x="0" y="0"/>
-          <a:ext cx="0" cy="0"/>
-          <a:chOff x="0" y="0"/>
-          <a:chExt cx="0" cy="0"/>
-        </a:xfrm>
-      </p:grpSpPr>
-      <p:sp>
-        <p:nvSpPr>
-          <p:cNvPr id="2" name="Title 1">
-            <a:extLst>
-              <a:ext uri="{FF2B5EF4-FFF2-40B4-BE49-F238E27FC236}">
-                <a16:creationId xmlns:a16="http://schemas.microsoft.com/office/drawing/2014/main" id="{51F2C05B-3556-493B-855C-1F19ADDBAF69}"/>
-              </a:ext>
-            </a:extLst>
-          </p:cNvPr>
-          <p:cNvSpPr>
-            <a:spLocks noGrp="1"/>
-          </p:cNvSpPr>
-          <p:nvPr>
-            <p:ph type="title"/>
-          </p:nvPr>
-        </p:nvSpPr>
-        <p:spPr>
-          <a:xfrm>
-            <a:off x="838200" y="365125"/>
-            <a:ext cx="11099104" cy="1325563"/>
-          </a:xfrm>
-        </p:spPr>
-        <p:txBody>
-          <a:bodyPr/>
-          <a:lstStyle/>
-          <a:p>
-            <a:r>
-              <a:rPr lang="en-US" b="1" dirty="0">
-                <a:solidFill>
-                  <a:schemeClr val="bg1"/>
-                </a:solidFill>
-              </a:rPr>
-              <a:t>as</a:t>
-            </a:r>
-          </a:p>
-        </p:txBody>
-      </p:sp>
-      <p:sp>
-        <p:nvSpPr>
-          <p:cNvPr id="4" name="TextBox 3">
-            <a:extLst>
-              <a:ext uri="{FF2B5EF4-FFF2-40B4-BE49-F238E27FC236}">
-                <a16:creationId xmlns:a16="http://schemas.microsoft.com/office/drawing/2014/main" id="{A32609F5-383A-417E-B9B0-CE955463E2E4}"/>
-              </a:ext>
-            </a:extLst>
-          </p:cNvPr>
-          <p:cNvSpPr txBox="1"/>
-          <p:nvPr/>
-        </p:nvSpPr>
-        <p:spPr>
-          <a:xfrm>
-            <a:off x="838200" y="1779687"/>
-            <a:ext cx="10515600" cy="369332"/>
-          </a:xfrm>
-          <a:prstGeom prst="rect">
-            <a:avLst/>
-          </a:prstGeom>
-          <a:noFill/>
-        </p:spPr>
-        <p:txBody>
-          <a:bodyPr wrap="square" rtlCol="0">
-            <a:spAutoFit/>
-          </a:bodyPr>
-          <a:lstStyle/>
-          <a:p>
-            <a:r>
-              <a:rPr lang="en-US" b="1" dirty="0" err="1">
-                <a:solidFill>
-                  <a:schemeClr val="bg1"/>
-                </a:solidFill>
-              </a:rPr>
-              <a:t>asd</a:t>
-            </a:r>
-            <a:endParaRPr lang="en-US" dirty="0">
-              <a:solidFill>
-                <a:schemeClr val="bg1"/>
-              </a:solidFill>
-            </a:endParaRPr>
-          </a:p>
-        </p:txBody>
-      </p:sp>
-    </p:spTree>
-    <p:extLst>
-      <p:ext uri="{BB962C8B-B14F-4D97-AF65-F5344CB8AC3E}">
-        <p14:creationId xmlns:p14="http://schemas.microsoft.com/office/powerpoint/2010/main" val="2453228912"/>
-      </p:ext>
-    </p:extLst>
-  </p:cSld>
-  <p:clrMapOvr>
-    <a:masterClrMapping/>
-  </p:clrMapOvr>
-</p:sld>
-</file>
-
-<file path=ppt/slides/slide26.xml><?xml version="1.0" encoding="utf-8"?>
-<p:sld xmlns:a="http://schemas.openxmlformats.org/drawingml/2006/main" xmlns:r="http://schemas.openxmlformats.org/officeDocument/2006/relationships" xmlns:p="http://schemas.openxmlformats.org/presentationml/2006/main">
-  <p:cSld>
-    <p:bg>
-      <p:bgPr>
-        <a:solidFill>
-          <a:schemeClr val="tx2">
-            <a:lumMod val="60000"/>
-            <a:lumOff val="40000"/>
-          </a:schemeClr>
-        </a:solidFill>
-        <a:effectLst/>
-      </p:bgPr>
-    </p:bg>
-    <p:spTree>
-      <p:nvGrpSpPr>
-        <p:cNvPr id="1" name=""/>
-        <p:cNvGrpSpPr/>
-        <p:nvPr/>
-      </p:nvGrpSpPr>
-      <p:grpSpPr>
-        <a:xfrm>
-          <a:off x="0" y="0"/>
-          <a:ext cx="0" cy="0"/>
-          <a:chOff x="0" y="0"/>
-          <a:chExt cx="0" cy="0"/>
-        </a:xfrm>
-      </p:grpSpPr>
-      <p:sp>
-        <p:nvSpPr>
-          <p:cNvPr id="2" name="Title 1">
-            <a:extLst>
-              <a:ext uri="{FF2B5EF4-FFF2-40B4-BE49-F238E27FC236}">
-                <a16:creationId xmlns:a16="http://schemas.microsoft.com/office/drawing/2014/main" id="{51F2C05B-3556-493B-855C-1F19ADDBAF69}"/>
-              </a:ext>
-            </a:extLst>
-          </p:cNvPr>
-          <p:cNvSpPr>
-            <a:spLocks noGrp="1"/>
-          </p:cNvSpPr>
-          <p:nvPr>
-            <p:ph type="title"/>
-          </p:nvPr>
-        </p:nvSpPr>
-        <p:spPr>
-          <a:xfrm>
-            <a:off x="838200" y="365125"/>
-            <a:ext cx="11099104" cy="1325563"/>
-          </a:xfrm>
-        </p:spPr>
-        <p:txBody>
-          <a:bodyPr/>
-          <a:lstStyle/>
-          <a:p>
-            <a:r>
-              <a:rPr lang="en-US" b="1" dirty="0">
-                <a:solidFill>
-                  <a:schemeClr val="bg1"/>
-                </a:solidFill>
-              </a:rPr>
-              <a:t>as</a:t>
-            </a:r>
-          </a:p>
-        </p:txBody>
-      </p:sp>
-      <p:sp>
-        <p:nvSpPr>
-          <p:cNvPr id="4" name="TextBox 3">
-            <a:extLst>
-              <a:ext uri="{FF2B5EF4-FFF2-40B4-BE49-F238E27FC236}">
-                <a16:creationId xmlns:a16="http://schemas.microsoft.com/office/drawing/2014/main" id="{A32609F5-383A-417E-B9B0-CE955463E2E4}"/>
-              </a:ext>
-            </a:extLst>
-          </p:cNvPr>
-          <p:cNvSpPr txBox="1"/>
-          <p:nvPr/>
-        </p:nvSpPr>
-        <p:spPr>
-          <a:xfrm>
-            <a:off x="838200" y="1779687"/>
-            <a:ext cx="10515600" cy="369332"/>
-          </a:xfrm>
-          <a:prstGeom prst="rect">
-            <a:avLst/>
-          </a:prstGeom>
-          <a:noFill/>
-        </p:spPr>
-        <p:txBody>
-          <a:bodyPr wrap="square" rtlCol="0">
-            <a:spAutoFit/>
-          </a:bodyPr>
-          <a:lstStyle/>
-          <a:p>
-            <a:r>
-              <a:rPr lang="en-US" b="1" dirty="0" err="1">
-                <a:solidFill>
-                  <a:schemeClr val="bg1"/>
-                </a:solidFill>
-              </a:rPr>
-              <a:t>asd</a:t>
-            </a:r>
-            <a:endParaRPr lang="en-US" dirty="0">
-              <a:solidFill>
-                <a:schemeClr val="bg1"/>
-              </a:solidFill>
-            </a:endParaRPr>
-          </a:p>
-        </p:txBody>
-      </p:sp>
-    </p:spTree>
-    <p:extLst>
-      <p:ext uri="{BB962C8B-B14F-4D97-AF65-F5344CB8AC3E}">
-        <p14:creationId xmlns:p14="http://schemas.microsoft.com/office/powerpoint/2010/main" val="3187117589"/>
-      </p:ext>
-    </p:extLst>
-  </p:cSld>
-  <p:clrMapOvr>
-    <a:masterClrMapping/>
-  </p:clrMapOvr>
-</p:sld>
-</file>
-
-<file path=ppt/slides/slide27.xml><?xml version="1.0" encoding="utf-8"?>
-<p:sld xmlns:a="http://schemas.openxmlformats.org/drawingml/2006/main" xmlns:r="http://schemas.openxmlformats.org/officeDocument/2006/relationships" xmlns:p="http://schemas.openxmlformats.org/presentationml/2006/main">
-  <p:cSld>
-    <p:bg>
-      <p:bgPr>
-        <a:solidFill>
-          <a:schemeClr val="tx2">
-            <a:lumMod val="60000"/>
-            <a:lumOff val="40000"/>
-          </a:schemeClr>
-        </a:solidFill>
-        <a:effectLst/>
-      </p:bgPr>
-    </p:bg>
-    <p:spTree>
-      <p:nvGrpSpPr>
-        <p:cNvPr id="1" name=""/>
-        <p:cNvGrpSpPr/>
-        <p:nvPr/>
-      </p:nvGrpSpPr>
-      <p:grpSpPr>
-        <a:xfrm>
-          <a:off x="0" y="0"/>
-          <a:ext cx="0" cy="0"/>
-          <a:chOff x="0" y="0"/>
-          <a:chExt cx="0" cy="0"/>
-        </a:xfrm>
-      </p:grpSpPr>
-      <p:sp>
-        <p:nvSpPr>
-          <p:cNvPr id="2" name="Title 1">
-            <a:extLst>
-              <a:ext uri="{FF2B5EF4-FFF2-40B4-BE49-F238E27FC236}">
-                <a16:creationId xmlns:a16="http://schemas.microsoft.com/office/drawing/2014/main" id="{51F2C05B-3556-493B-855C-1F19ADDBAF69}"/>
-              </a:ext>
-            </a:extLst>
-          </p:cNvPr>
-          <p:cNvSpPr>
-            <a:spLocks noGrp="1"/>
-          </p:cNvSpPr>
-          <p:nvPr>
-            <p:ph type="title"/>
-          </p:nvPr>
-        </p:nvSpPr>
-        <p:spPr>
-          <a:xfrm>
-            <a:off x="838200" y="365125"/>
-            <a:ext cx="11099104" cy="1325563"/>
-          </a:xfrm>
-        </p:spPr>
-        <p:txBody>
-          <a:bodyPr/>
-          <a:lstStyle/>
-          <a:p>
-            <a:r>
-              <a:rPr lang="en-US" b="1" dirty="0">
-                <a:solidFill>
-                  <a:schemeClr val="bg1"/>
-                </a:solidFill>
-              </a:rPr>
-              <a:t>as</a:t>
-            </a:r>
-          </a:p>
-        </p:txBody>
-      </p:sp>
-      <p:sp>
-        <p:nvSpPr>
-          <p:cNvPr id="4" name="TextBox 3">
-            <a:extLst>
-              <a:ext uri="{FF2B5EF4-FFF2-40B4-BE49-F238E27FC236}">
-                <a16:creationId xmlns:a16="http://schemas.microsoft.com/office/drawing/2014/main" id="{A32609F5-383A-417E-B9B0-CE955463E2E4}"/>
-              </a:ext>
-            </a:extLst>
-          </p:cNvPr>
-          <p:cNvSpPr txBox="1"/>
-          <p:nvPr/>
-        </p:nvSpPr>
-        <p:spPr>
-          <a:xfrm>
-            <a:off x="838200" y="1779687"/>
-            <a:ext cx="10515600" cy="369332"/>
-          </a:xfrm>
-          <a:prstGeom prst="rect">
-            <a:avLst/>
-          </a:prstGeom>
-          <a:noFill/>
-        </p:spPr>
-        <p:txBody>
-          <a:bodyPr wrap="square" rtlCol="0">
-            <a:spAutoFit/>
-          </a:bodyPr>
-          <a:lstStyle/>
-          <a:p>
-            <a:r>
-              <a:rPr lang="en-US" b="1" dirty="0" err="1">
-                <a:solidFill>
-                  <a:schemeClr val="bg1"/>
-                </a:solidFill>
-              </a:rPr>
-              <a:t>asd</a:t>
-            </a:r>
-            <a:endParaRPr lang="en-US" dirty="0">
-              <a:solidFill>
-                <a:schemeClr val="bg1"/>
-              </a:solidFill>
-            </a:endParaRPr>
-          </a:p>
-        </p:txBody>
-      </p:sp>
-    </p:spTree>
-    <p:extLst>
-      <p:ext uri="{BB962C8B-B14F-4D97-AF65-F5344CB8AC3E}">
-        <p14:creationId xmlns:p14="http://schemas.microsoft.com/office/powerpoint/2010/main" val="2991810940"/>
-      </p:ext>
-    </p:extLst>
-  </p:cSld>
-  <p:clrMapOvr>
-    <a:masterClrMapping/>
-  </p:clrMapOvr>
-</p:sld>
-</file>
-
-<file path=ppt/slides/slide28.xml><?xml version="1.0" encoding="utf-8"?>
-<p:sld xmlns:a="http://schemas.openxmlformats.org/drawingml/2006/main" xmlns:r="http://schemas.openxmlformats.org/officeDocument/2006/relationships" xmlns:p="http://schemas.openxmlformats.org/presentationml/2006/main">
-  <p:cSld>
-    <p:bg>
-      <p:bgPr>
-        <a:solidFill>
-          <a:schemeClr val="tx2">
-            <a:lumMod val="60000"/>
-            <a:lumOff val="40000"/>
-          </a:schemeClr>
-        </a:solidFill>
-        <a:effectLst/>
-      </p:bgPr>
-    </p:bg>
-    <p:spTree>
-      <p:nvGrpSpPr>
-        <p:cNvPr id="1" name=""/>
-        <p:cNvGrpSpPr/>
-        <p:nvPr/>
-      </p:nvGrpSpPr>
-      <p:grpSpPr>
-        <a:xfrm>
-          <a:off x="0" y="0"/>
-          <a:ext cx="0" cy="0"/>
-          <a:chOff x="0" y="0"/>
-          <a:chExt cx="0" cy="0"/>
-        </a:xfrm>
-      </p:grpSpPr>
-      <p:sp>
-        <p:nvSpPr>
-          <p:cNvPr id="2" name="Title 1">
-            <a:extLst>
-              <a:ext uri="{FF2B5EF4-FFF2-40B4-BE49-F238E27FC236}">
-                <a16:creationId xmlns:a16="http://schemas.microsoft.com/office/drawing/2014/main" id="{51F2C05B-3556-493B-855C-1F19ADDBAF69}"/>
-              </a:ext>
-            </a:extLst>
-          </p:cNvPr>
-          <p:cNvSpPr>
-            <a:spLocks noGrp="1"/>
-          </p:cNvSpPr>
-          <p:nvPr>
-            <p:ph type="title"/>
-          </p:nvPr>
-        </p:nvSpPr>
-        <p:spPr>
-          <a:xfrm>
-            <a:off x="838200" y="365125"/>
-            <a:ext cx="11099104" cy="1325563"/>
-          </a:xfrm>
-        </p:spPr>
-        <p:txBody>
-          <a:bodyPr/>
-          <a:lstStyle/>
-          <a:p>
-            <a:r>
-              <a:rPr lang="en-US" b="1" dirty="0">
-                <a:solidFill>
-                  <a:schemeClr val="bg1"/>
-                </a:solidFill>
-              </a:rPr>
-              <a:t>as</a:t>
-            </a:r>
-          </a:p>
-        </p:txBody>
-      </p:sp>
-      <p:sp>
-        <p:nvSpPr>
-          <p:cNvPr id="4" name="TextBox 3">
-            <a:extLst>
-              <a:ext uri="{FF2B5EF4-FFF2-40B4-BE49-F238E27FC236}">
-                <a16:creationId xmlns:a16="http://schemas.microsoft.com/office/drawing/2014/main" id="{A32609F5-383A-417E-B9B0-CE955463E2E4}"/>
-              </a:ext>
-            </a:extLst>
-          </p:cNvPr>
-          <p:cNvSpPr txBox="1"/>
-          <p:nvPr/>
-        </p:nvSpPr>
-        <p:spPr>
-          <a:xfrm>
-            <a:off x="838200" y="1779687"/>
-            <a:ext cx="10515600" cy="369332"/>
-          </a:xfrm>
-          <a:prstGeom prst="rect">
-            <a:avLst/>
-          </a:prstGeom>
-          <a:noFill/>
-        </p:spPr>
-        <p:txBody>
-          <a:bodyPr wrap="square" rtlCol="0">
-            <a:spAutoFit/>
-          </a:bodyPr>
-          <a:lstStyle/>
-          <a:p>
-            <a:r>
-              <a:rPr lang="en-US" b="1" dirty="0" err="1">
-                <a:solidFill>
-                  <a:schemeClr val="bg1"/>
-                </a:solidFill>
-              </a:rPr>
-              <a:t>asd</a:t>
-            </a:r>
-            <a:endParaRPr lang="en-US" dirty="0">
-              <a:solidFill>
-                <a:schemeClr val="bg1"/>
-              </a:solidFill>
-            </a:endParaRPr>
-          </a:p>
-        </p:txBody>
-      </p:sp>
-    </p:spTree>
-    <p:extLst>
-      <p:ext uri="{BB962C8B-B14F-4D97-AF65-F5344CB8AC3E}">
-        <p14:creationId xmlns:p14="http://schemas.microsoft.com/office/powerpoint/2010/main" val="936731269"/>
-      </p:ext>
-    </p:extLst>
-  </p:cSld>
-  <p:clrMapOvr>
-    <a:masterClrMapping/>
-  </p:clrMapOvr>
-</p:sld>
-</file>
-
-<file path=ppt/slides/slide29.xml><?xml version="1.0" encoding="utf-8"?>
-<p:sld xmlns:a="http://schemas.openxmlformats.org/drawingml/2006/main" xmlns:r="http://schemas.openxmlformats.org/officeDocument/2006/relationships" xmlns:p="http://schemas.openxmlformats.org/presentationml/2006/main">
-  <p:cSld>
-    <p:bg>
-      <p:bgPr>
-        <a:solidFill>
-          <a:schemeClr val="tx2">
-            <a:lumMod val="60000"/>
-            <a:lumOff val="40000"/>
-          </a:schemeClr>
-        </a:solidFill>
-        <a:effectLst/>
-      </p:bgPr>
-    </p:bg>
-    <p:spTree>
-      <p:nvGrpSpPr>
-        <p:cNvPr id="1" name=""/>
-        <p:cNvGrpSpPr/>
-        <p:nvPr/>
-      </p:nvGrpSpPr>
-      <p:grpSpPr>
-        <a:xfrm>
-          <a:off x="0" y="0"/>
-          <a:ext cx="0" cy="0"/>
-          <a:chOff x="0" y="0"/>
-          <a:chExt cx="0" cy="0"/>
-        </a:xfrm>
-      </p:grpSpPr>
-      <p:sp>
-        <p:nvSpPr>
-          <p:cNvPr id="2" name="Title 1">
-            <a:extLst>
-              <a:ext uri="{FF2B5EF4-FFF2-40B4-BE49-F238E27FC236}">
-                <a16:creationId xmlns:a16="http://schemas.microsoft.com/office/drawing/2014/main" id="{51F2C05B-3556-493B-855C-1F19ADDBAF69}"/>
-              </a:ext>
-            </a:extLst>
-          </p:cNvPr>
-          <p:cNvSpPr>
-            <a:spLocks noGrp="1"/>
-          </p:cNvSpPr>
-          <p:nvPr>
-            <p:ph type="title"/>
-          </p:nvPr>
-        </p:nvSpPr>
-        <p:spPr>
-          <a:xfrm>
-            <a:off x="838200" y="365125"/>
-            <a:ext cx="11099104" cy="1325563"/>
-          </a:xfrm>
-        </p:spPr>
-        <p:txBody>
-          <a:bodyPr/>
-          <a:lstStyle/>
-          <a:p>
-            <a:r>
-              <a:rPr lang="en-US" b="1" dirty="0">
-                <a:solidFill>
-                  <a:schemeClr val="bg1"/>
-                </a:solidFill>
-              </a:rPr>
-              <a:t>as</a:t>
-            </a:r>
-          </a:p>
-        </p:txBody>
-      </p:sp>
-      <p:sp>
-        <p:nvSpPr>
-          <p:cNvPr id="4" name="TextBox 3">
-            <a:extLst>
-              <a:ext uri="{FF2B5EF4-FFF2-40B4-BE49-F238E27FC236}">
-                <a16:creationId xmlns:a16="http://schemas.microsoft.com/office/drawing/2014/main" id="{A32609F5-383A-417E-B9B0-CE955463E2E4}"/>
-              </a:ext>
-            </a:extLst>
-          </p:cNvPr>
-          <p:cNvSpPr txBox="1"/>
-          <p:nvPr/>
-        </p:nvSpPr>
-        <p:spPr>
-          <a:xfrm>
-            <a:off x="838200" y="1779687"/>
-            <a:ext cx="10515600" cy="369332"/>
-          </a:xfrm>
-          <a:prstGeom prst="rect">
-            <a:avLst/>
-          </a:prstGeom>
-          <a:noFill/>
-        </p:spPr>
-        <p:txBody>
-          <a:bodyPr wrap="square" rtlCol="0">
-            <a:spAutoFit/>
-          </a:bodyPr>
-          <a:lstStyle/>
-          <a:p>
-            <a:r>
-              <a:rPr lang="en-US" b="1" dirty="0" err="1">
-                <a:solidFill>
-                  <a:schemeClr val="bg1"/>
-                </a:solidFill>
-              </a:rPr>
-              <a:t>asd</a:t>
-            </a:r>
-            <a:endParaRPr lang="en-US" dirty="0">
-              <a:solidFill>
-                <a:schemeClr val="bg1"/>
-              </a:solidFill>
-            </a:endParaRPr>
-          </a:p>
-        </p:txBody>
-      </p:sp>
-    </p:spTree>
-    <p:extLst>
-      <p:ext uri="{BB962C8B-B14F-4D97-AF65-F5344CB8AC3E}">
-        <p14:creationId xmlns:p14="http://schemas.microsoft.com/office/powerpoint/2010/main" val="1206675036"/>
       </p:ext>
     </p:extLst>
   </p:cSld>
@@ -7132,56 +5955,37 @@
                   <a:schemeClr val="bg1"/>
                 </a:solidFill>
               </a:rPr>
-              <a:t>	Refine above with Resource URI's</a:t>
-            </a:r>
-          </a:p>
-          <a:p>
-            <a:r>
-              <a:rPr lang="en-US" b="1" dirty="0">
-                <a:solidFill>
-                  <a:schemeClr val="bg1"/>
-                </a:solidFill>
-              </a:rPr>
-              <a:t>	Message request to one URI</a:t>
-            </a:r>
-          </a:p>
-          <a:p>
-            <a:r>
-              <a:rPr lang="en-US" b="1" dirty="0">
-                <a:solidFill>
-                  <a:schemeClr val="bg1"/>
-                </a:solidFill>
-              </a:rPr>
-              <a:t>	Common to another </a:t>
-            </a:r>
-            <a:r>
-              <a:rPr lang="en-US" b="1" dirty="0" err="1">
-                <a:solidFill>
-                  <a:schemeClr val="bg1"/>
-                </a:solidFill>
-              </a:rPr>
-              <a:t>ect</a:t>
-            </a:r>
-            <a:r>
-              <a:rPr lang="en-US" b="1" dirty="0">
-                <a:solidFill>
-                  <a:schemeClr val="bg1"/>
-                </a:solidFill>
-              </a:rPr>
-              <a:t>...</a:t>
-            </a:r>
-          </a:p>
-          <a:p>
-            <a:r>
-              <a:rPr lang="en-US" b="1" dirty="0">
-                <a:solidFill>
-                  <a:schemeClr val="bg1"/>
-                </a:solidFill>
-              </a:rPr>
-              <a:t>	All information about what should happen is a part of Request Body. </a:t>
-            </a:r>
-          </a:p>
-          <a:p>
+              <a:t>	Refine above with Resource URI’s</a:t>
+            </a:r>
+          </a:p>
+          <a:p>
+            <a:r>
+              <a:rPr lang="en-US" b="1" dirty="0">
+                <a:solidFill>
+                  <a:schemeClr val="bg1"/>
+                </a:solidFill>
+              </a:rPr>
+              <a:t>	Request for each resource has a separate URI</a:t>
+            </a:r>
+          </a:p>
+          <a:p>
+            <a:r>
+              <a:rPr lang="en-US" b="1" dirty="0">
+                <a:solidFill>
+                  <a:schemeClr val="bg1"/>
+                </a:solidFill>
+              </a:rPr>
+              <a:t>		</a:t>
+            </a:r>
+            <a:r>
+              <a:rPr lang="en-US" b="1" dirty="0">
+                <a:solidFill>
+                  <a:schemeClr val="bg1"/>
+                </a:solidFill>
+                <a:hlinkClick r:id="rId2"/>
+              </a:rPr>
+              <a:t>http://abc.com/employees</a:t>
+            </a:r>
             <a:endParaRPr lang="en-US" b="1" dirty="0">
               <a:solidFill>
                 <a:schemeClr val="bg1"/>
@@ -7195,6 +5999,58 @@
                   <a:schemeClr val="bg1"/>
                 </a:solidFill>
               </a:rPr>
+              <a:t>		Rest of the data is still in </a:t>
+            </a:r>
+            <a:r>
+              <a:rPr lang="en-US" b="1" dirty="0" err="1">
+                <a:solidFill>
+                  <a:schemeClr val="bg1"/>
+                </a:solidFill>
+              </a:rPr>
+              <a:t>RequestBody</a:t>
+            </a:r>
+            <a:r>
+              <a:rPr lang="en-US" b="1" dirty="0">
+                <a:solidFill>
+                  <a:schemeClr val="bg1"/>
+                </a:solidFill>
+              </a:rPr>
+              <a:t>.</a:t>
+            </a:r>
+          </a:p>
+          <a:p>
+            <a:r>
+              <a:rPr lang="en-US" b="1" dirty="0">
+                <a:solidFill>
+                  <a:schemeClr val="bg1"/>
+                </a:solidFill>
+              </a:rPr>
+              <a:t>		Whether to create/update/delete is also a part of the </a:t>
+            </a:r>
+            <a:r>
+              <a:rPr lang="en-US" b="1" dirty="0" err="1">
+                <a:solidFill>
+                  <a:schemeClr val="bg1"/>
+                </a:solidFill>
+              </a:rPr>
+              <a:t>RequestBody</a:t>
+            </a:r>
+            <a:r>
+              <a:rPr lang="en-US" b="1" dirty="0">
+                <a:solidFill>
+                  <a:schemeClr val="bg1"/>
+                </a:solidFill>
+              </a:rPr>
+              <a:t>.</a:t>
+            </a:r>
+          </a:p>
+          <a:p>
+            <a:r>
+              <a:rPr lang="en-US" b="1" dirty="0">
+                <a:solidFill>
+                  <a:schemeClr val="bg1"/>
+                </a:solidFill>
+              </a:rPr>
               <a:t>Level 2</a:t>
             </a:r>
           </a:p>
@@ -7205,7 +6061,7 @@
                   <a:schemeClr val="bg1"/>
                 </a:solidFill>
               </a:rPr>
-              <a:t>	Different http methods for above requests</a:t>
+              <a:t>	Different http methods used for above requests</a:t>
             </a:r>
           </a:p>
           <a:p>

</xml_diff>

<commit_message>
changes in instruction, Hystrix, Tests in Employee service
</commit_message>
<xml_diff>
--- a/training/day2/Day2.pptx
+++ b/training/day2/Day2.pptx
@@ -5267,7 +5267,7 @@
           <a:lstStyle/>
           <a:p>
             <a:r>
-              <a:rPr lang="en-US" dirty="0">
+              <a:rPr lang="en-US" b="1" dirty="0">
                 <a:solidFill>
                   <a:schemeClr val="bg1"/>
                 </a:solidFill>
@@ -5277,7 +5277,7 @@
           </a:p>
           <a:p>
             <a:r>
-              <a:rPr lang="en-US" dirty="0">
+              <a:rPr lang="en-US" b="1" dirty="0">
                 <a:solidFill>
                   <a:schemeClr val="bg1"/>
                 </a:solidFill>
@@ -5287,7 +5287,7 @@
           </a:p>
           <a:p>
             <a:r>
-              <a:rPr lang="en-US" dirty="0">
+              <a:rPr lang="en-US" b="1" dirty="0">
                 <a:solidFill>
                   <a:schemeClr val="bg1"/>
                 </a:solidFill>
@@ -5297,7 +5297,7 @@
           </a:p>
           <a:p>
             <a:r>
-              <a:rPr lang="en-US" dirty="0">
+              <a:rPr lang="en-US" b="1" dirty="0">
                 <a:solidFill>
                   <a:schemeClr val="bg1"/>
                 </a:solidFill>
@@ -5306,7 +5306,7 @@
             </a:r>
           </a:p>
           <a:p>
-            <a:endParaRPr lang="en-US" dirty="0">
+            <a:endParaRPr lang="en-US" b="1" dirty="0">
               <a:solidFill>
                 <a:schemeClr val="bg1"/>
               </a:solidFill>
@@ -5314,7 +5314,7 @@
           </a:p>
           <a:p>
             <a:r>
-              <a:rPr lang="en-US" dirty="0">
+              <a:rPr lang="en-US" b="1" dirty="0">
                 <a:solidFill>
                   <a:schemeClr val="bg1"/>
                 </a:solidFill>
@@ -5324,7 +5324,7 @@
           </a:p>
           <a:p>
             <a:r>
-              <a:rPr lang="en-US" dirty="0">
+              <a:rPr lang="en-US" b="1" dirty="0">
                 <a:solidFill>
                   <a:schemeClr val="bg1"/>
                 </a:solidFill>
@@ -5334,7 +5334,7 @@
           </a:p>
           <a:p>
             <a:r>
-              <a:rPr lang="en-US" dirty="0">
+              <a:rPr lang="en-US" b="1" dirty="0">
                 <a:solidFill>
                   <a:schemeClr val="bg1"/>
                 </a:solidFill>
@@ -5342,7 +5342,7 @@
               <a:t>	2. Add "</a:t>
             </a:r>
             <a:r>
-              <a:rPr lang="en-US" dirty="0" err="1">
+              <a:rPr lang="en-US" b="1" dirty="0" err="1">
                 <a:solidFill>
                   <a:schemeClr val="bg1"/>
                 </a:solidFill>
@@ -5350,7 +5350,7 @@
               <a:t>management.endpoints.web.exposure.include</a:t>
             </a:r>
             <a:r>
-              <a:rPr lang="en-US" dirty="0">
+              <a:rPr lang="en-US" b="1" dirty="0">
                 <a:solidFill>
                   <a:schemeClr val="bg1"/>
                 </a:solidFill>
@@ -5360,7 +5360,7 @@
           </a:p>
           <a:p>
             <a:r>
-              <a:rPr lang="en-US" dirty="0">
+              <a:rPr lang="en-US" b="1" dirty="0">
                 <a:solidFill>
                   <a:schemeClr val="bg1"/>
                 </a:solidFill>
@@ -5368,14 +5368,14 @@
               <a:t>	3. Access the following </a:t>
             </a:r>
             <a:r>
-              <a:rPr lang="en-US" dirty="0" err="1">
+              <a:rPr lang="en-US" b="1" dirty="0" err="1">
                 <a:solidFill>
                   <a:schemeClr val="bg1"/>
                 </a:solidFill>
               </a:rPr>
               <a:t>url’s</a:t>
             </a:r>
-            <a:endParaRPr lang="en-US" dirty="0">
+            <a:endParaRPr lang="en-US" b="1" dirty="0">
               <a:solidFill>
                 <a:schemeClr val="bg1"/>
               </a:solidFill>
@@ -5383,7 +5383,7 @@
           </a:p>
           <a:p>
             <a:r>
-              <a:rPr lang="en-US" dirty="0">
+              <a:rPr lang="en-US" b="1" dirty="0">
                 <a:solidFill>
                   <a:schemeClr val="bg1"/>
                 </a:solidFill>
@@ -5393,7 +5393,7 @@
           </a:p>
           <a:p>
             <a:r>
-              <a:rPr lang="en-US" dirty="0">
+              <a:rPr lang="en-US" b="1" dirty="0">
                 <a:solidFill>
                   <a:schemeClr val="bg1"/>
                 </a:solidFill>
@@ -5401,7 +5401,7 @@
               <a:t>		localhost:8080/metrics	#Metrics of the application 	– e.g. Memory, CPU </a:t>
             </a:r>
             <a:r>
-              <a:rPr lang="en-US" dirty="0" err="1">
+              <a:rPr lang="en-US" b="1" dirty="0" err="1">
                 <a:solidFill>
                   <a:schemeClr val="bg1"/>
                 </a:solidFill>
@@ -5409,7 +5409,7 @@
               <a:t>ect</a:t>
             </a:r>
             <a:r>
-              <a:rPr lang="en-US" dirty="0">
+              <a:rPr lang="en-US" b="1" dirty="0">
                 <a:solidFill>
                   <a:schemeClr val="bg1"/>
                 </a:solidFill>
@@ -5419,7 +5419,7 @@
           </a:p>
           <a:p>
             <a:r>
-              <a:rPr lang="en-US" dirty="0">
+              <a:rPr lang="en-US" b="1" dirty="0">
                 <a:solidFill>
                   <a:schemeClr val="bg1"/>
                 </a:solidFill>
@@ -5429,7 +5429,7 @@
           </a:p>
           <a:p>
             <a:r>
-              <a:rPr lang="en-US" dirty="0">
+              <a:rPr lang="en-US" b="1" dirty="0">
                 <a:solidFill>
                   <a:schemeClr val="bg1"/>
                 </a:solidFill>
@@ -5439,7 +5439,7 @@
           </a:p>
           <a:p>
             <a:r>
-              <a:rPr lang="en-US" dirty="0">
+              <a:rPr lang="en-US" b="1" dirty="0">
                 <a:solidFill>
                   <a:schemeClr val="bg1"/>
                 </a:solidFill>
@@ -5447,7 +5447,7 @@
               <a:t>	Add </a:t>
             </a:r>
             <a:r>
-              <a:rPr lang="en-US" dirty="0" err="1">
+              <a:rPr lang="en-US" b="1" dirty="0" err="1">
                 <a:solidFill>
                   <a:schemeClr val="bg1"/>
                 </a:solidFill>
@@ -5455,7 +5455,7 @@
               <a:t>endpoints.health.sensitive</a:t>
             </a:r>
             <a:r>
-              <a:rPr lang="en-US" dirty="0">
+              <a:rPr lang="en-US" b="1" dirty="0">
                 <a:solidFill>
                   <a:schemeClr val="bg1"/>
                 </a:solidFill>
@@ -5465,7 +5465,7 @@
           </a:p>
           <a:p>
             <a:r>
-              <a:rPr lang="en-US" dirty="0">
+              <a:rPr lang="en-US" b="1" dirty="0">
                 <a:solidFill>
                   <a:schemeClr val="bg1"/>
                 </a:solidFill>
@@ -5475,20 +5475,12 @@
           </a:p>
           <a:p>
             <a:r>
-              <a:rPr lang="en-US" dirty="0">
-                <a:solidFill>
-                  <a:schemeClr val="bg1"/>
-                </a:solidFill>
-              </a:rPr>
-              <a:t>	spring.</a:t>
-            </a:r>
-            <a:r>
-              <a:rPr lang="en-US">
-                <a:solidFill>
-                  <a:schemeClr val="bg1"/>
-                </a:solidFill>
-              </a:rPr>
-              <a:t>io site.</a:t>
+              <a:rPr lang="en-US" b="1" dirty="0">
+                <a:solidFill>
+                  <a:schemeClr val="bg1"/>
+                </a:solidFill>
+              </a:rPr>
+              <a:t>	spring.io site.</a:t>
             </a:r>
             <a:r>
               <a:rPr lang="en-US" dirty="0">

</xml_diff>